<commit_message>
Refactor ome-zarr and tiff
</commit_message>
<xml_diff>
--- a/figures/resources/ome-zarr.pptx
+++ b/figures/resources/ome-zarr.pptx
@@ -6,6 +6,8 @@
   </p:sldMasterIdLst>
   <p:sldIdLst>
     <p:sldId id="256" r:id="rId2"/>
+    <p:sldId id="257" r:id="rId3"/>
+    <p:sldId id="258" r:id="rId4"/>
   </p:sldIdLst>
   <p:sldSz cx="12192000" cy="6858000"/>
   <p:notesSz cx="6858000" cy="9144000"/>
@@ -104,6 +106,11 @@
       </a:defRPr>
     </a:lvl9pPr>
   </p:defaultTextStyle>
+  <p:extLst>
+    <p:ext uri="{EFAFB233-063F-42B5-8137-9DF3F51BA10A}">
+      <p15:sldGuideLst xmlns:p15="http://schemas.microsoft.com/office/powerpoint/2012/main"/>
+    </p:ext>
+  </p:extLst>
 </p:presentation>
 </file>
 
@@ -256,7 +263,7 @@
           <a:p>
             <a:fld id="{259F230F-3794-D14A-8559-3E9D41919057}" type="datetimeFigureOut">
               <a:rPr lang="de-DE" smtClean="0"/>
-              <a:t>05.02.22</a:t>
+              <a:t>28.04.23</a:t>
             </a:fld>
             <a:endParaRPr lang="de-DE"/>
           </a:p>
@@ -456,7 +463,7 @@
           <a:p>
             <a:fld id="{259F230F-3794-D14A-8559-3E9D41919057}" type="datetimeFigureOut">
               <a:rPr lang="de-DE" smtClean="0"/>
-              <a:t>05.02.22</a:t>
+              <a:t>28.04.23</a:t>
             </a:fld>
             <a:endParaRPr lang="de-DE"/>
           </a:p>
@@ -666,7 +673,7 @@
           <a:p>
             <a:fld id="{259F230F-3794-D14A-8559-3E9D41919057}" type="datetimeFigureOut">
               <a:rPr lang="de-DE" smtClean="0"/>
-              <a:t>05.02.22</a:t>
+              <a:t>28.04.23</a:t>
             </a:fld>
             <a:endParaRPr lang="de-DE"/>
           </a:p>
@@ -866,7 +873,7 @@
           <a:p>
             <a:fld id="{259F230F-3794-D14A-8559-3E9D41919057}" type="datetimeFigureOut">
               <a:rPr lang="de-DE" smtClean="0"/>
-              <a:t>05.02.22</a:t>
+              <a:t>28.04.23</a:t>
             </a:fld>
             <a:endParaRPr lang="de-DE"/>
           </a:p>
@@ -1142,7 +1149,7 @@
           <a:p>
             <a:fld id="{259F230F-3794-D14A-8559-3E9D41919057}" type="datetimeFigureOut">
               <a:rPr lang="de-DE" smtClean="0"/>
-              <a:t>05.02.22</a:t>
+              <a:t>28.04.23</a:t>
             </a:fld>
             <a:endParaRPr lang="de-DE"/>
           </a:p>
@@ -1410,7 +1417,7 @@
           <a:p>
             <a:fld id="{259F230F-3794-D14A-8559-3E9D41919057}" type="datetimeFigureOut">
               <a:rPr lang="de-DE" smtClean="0"/>
-              <a:t>05.02.22</a:t>
+              <a:t>28.04.23</a:t>
             </a:fld>
             <a:endParaRPr lang="de-DE"/>
           </a:p>
@@ -1825,7 +1832,7 @@
           <a:p>
             <a:fld id="{259F230F-3794-D14A-8559-3E9D41919057}" type="datetimeFigureOut">
               <a:rPr lang="de-DE" smtClean="0"/>
-              <a:t>05.02.22</a:t>
+              <a:t>28.04.23</a:t>
             </a:fld>
             <a:endParaRPr lang="de-DE"/>
           </a:p>
@@ -1967,7 +1974,7 @@
           <a:p>
             <a:fld id="{259F230F-3794-D14A-8559-3E9D41919057}" type="datetimeFigureOut">
               <a:rPr lang="de-DE" smtClean="0"/>
-              <a:t>05.02.22</a:t>
+              <a:t>28.04.23</a:t>
             </a:fld>
             <a:endParaRPr lang="de-DE"/>
           </a:p>
@@ -2080,7 +2087,7 @@
           <a:p>
             <a:fld id="{259F230F-3794-D14A-8559-3E9D41919057}" type="datetimeFigureOut">
               <a:rPr lang="de-DE" smtClean="0"/>
-              <a:t>05.02.22</a:t>
+              <a:t>28.04.23</a:t>
             </a:fld>
             <a:endParaRPr lang="de-DE"/>
           </a:p>
@@ -2393,7 +2400,7 @@
           <a:p>
             <a:fld id="{259F230F-3794-D14A-8559-3E9D41919057}" type="datetimeFigureOut">
               <a:rPr lang="de-DE" smtClean="0"/>
-              <a:t>05.02.22</a:t>
+              <a:t>28.04.23</a:t>
             </a:fld>
             <a:endParaRPr lang="de-DE"/>
           </a:p>
@@ -2682,7 +2689,7 @@
           <a:p>
             <a:fld id="{259F230F-3794-D14A-8559-3E9D41919057}" type="datetimeFigureOut">
               <a:rPr lang="de-DE" smtClean="0"/>
-              <a:t>05.02.22</a:t>
+              <a:t>28.04.23</a:t>
             </a:fld>
             <a:endParaRPr lang="de-DE"/>
           </a:p>
@@ -2925,7 +2932,7 @@
           <a:p>
             <a:fld id="{259F230F-3794-D14A-8559-3E9D41919057}" type="datetimeFigureOut">
               <a:rPr lang="de-DE" smtClean="0"/>
-              <a:t>05.02.22</a:t>
+              <a:t>28.04.23</a:t>
             </a:fld>
             <a:endParaRPr lang="de-DE"/>
           </a:p>
@@ -3435,6 +3442,369 @@
 </p:sld>
 </file>
 
+<file path=ppt/slides/slide2.xml><?xml version="1.0" encoding="utf-8"?>
+<p:sld xmlns:a="http://schemas.openxmlformats.org/drawingml/2006/main" xmlns:r="http://schemas.openxmlformats.org/officeDocument/2006/relationships" xmlns:p="http://schemas.openxmlformats.org/presentationml/2006/main">
+  <p:cSld>
+    <p:spTree>
+      <p:nvGrpSpPr>
+        <p:cNvPr id="1" name=""/>
+        <p:cNvGrpSpPr/>
+        <p:nvPr/>
+      </p:nvGrpSpPr>
+      <p:grpSpPr>
+        <a:xfrm>
+          <a:off x="0" y="0"/>
+          <a:ext cx="0" cy="0"/>
+          <a:chOff x="0" y="0"/>
+          <a:chExt cx="0" cy="0"/>
+        </a:xfrm>
+      </p:grpSpPr>
+      <p:pic>
+        <p:nvPicPr>
+          <p:cNvPr id="1026" name="Picture 2" descr="https://lh3.googleusercontent.com/QFcLjzHlhPh44VWSVC8lW4QXti21uU7zCrtaJjmpyv6VEBMnF4fRuu8IWU9XE5ytp1pgrONMCTknQTXn861TI0N9H8C1kz0O--BXNeOFK1WgKFrK5nnAHD9doMxWIiLqWhvXz_BNXXOSyGQ8H1ku0xFzQg=s2048">
+            <a:extLst>
+              <a:ext uri="{FF2B5EF4-FFF2-40B4-BE49-F238E27FC236}">
+                <a16:creationId xmlns:a16="http://schemas.microsoft.com/office/drawing/2014/main" id="{C4AE0A58-95E0-7945-8F7A-0C62C7A80D78}"/>
+              </a:ext>
+            </a:extLst>
+          </p:cNvPr>
+          <p:cNvPicPr>
+            <a:picLocks noChangeAspect="1" noChangeArrowheads="1"/>
+          </p:cNvPicPr>
+          <p:nvPr/>
+        </p:nvPicPr>
+        <p:blipFill>
+          <a:blip r:embed="rId2">
+            <a:extLst>
+              <a:ext uri="{28A0092B-C50C-407E-A947-70E740481C1C}">
+                <a14:useLocalDpi xmlns:a14="http://schemas.microsoft.com/office/drawing/2010/main" val="0"/>
+              </a:ext>
+            </a:extLst>
+          </a:blip>
+          <a:srcRect/>
+          <a:stretch>
+            <a:fillRect/>
+          </a:stretch>
+        </p:blipFill>
+        <p:spPr bwMode="auto">
+          <a:xfrm>
+            <a:off x="783771" y="741548"/>
+            <a:ext cx="4614222" cy="4614224"/>
+          </a:xfrm>
+          <a:prstGeom prst="rect">
+            <a:avLst/>
+          </a:prstGeom>
+          <a:noFill/>
+          <a:extLst>
+            <a:ext uri="{909E8E84-426E-40DD-AFC4-6F175D3DCCD1}">
+              <a14:hiddenFill xmlns:a14="http://schemas.microsoft.com/office/drawing/2010/main">
+                <a:solidFill>
+                  <a:srgbClr val="FFFFFF"/>
+                </a:solidFill>
+              </a14:hiddenFill>
+            </a:ext>
+          </a:extLst>
+        </p:spPr>
+      </p:pic>
+      <p:pic>
+        <p:nvPicPr>
+          <p:cNvPr id="1027" name="Picture 3" descr="https://lh4.googleusercontent.com/QL06NY1jIk8r8VzAob5Pg9JVj9vA9hu-tW0R8cCaTb54UU41zANmZ1iFPLfnm3zool0ZEL-MLe49QLPOP9o4WGwy8CyXYTZvbiTb6egEDmmZEFnxcW8leau23FSTKKi0YqpHZ6HtOMVgC_t6_hvXJclnXA=s2048">
+            <a:extLst>
+              <a:ext uri="{FF2B5EF4-FFF2-40B4-BE49-F238E27FC236}">
+                <a16:creationId xmlns:a16="http://schemas.microsoft.com/office/drawing/2014/main" id="{24668395-051B-4D49-A28F-423385F3C93E}"/>
+              </a:ext>
+            </a:extLst>
+          </p:cNvPr>
+          <p:cNvPicPr>
+            <a:picLocks noChangeAspect="1" noChangeArrowheads="1"/>
+          </p:cNvPicPr>
+          <p:nvPr/>
+        </p:nvPicPr>
+        <p:blipFill>
+          <a:blip r:embed="rId3">
+            <a:extLst>
+              <a:ext uri="{28A0092B-C50C-407E-A947-70E740481C1C}">
+                <a14:useLocalDpi xmlns:a14="http://schemas.microsoft.com/office/drawing/2010/main" val="0"/>
+              </a:ext>
+            </a:extLst>
+          </a:blip>
+          <a:srcRect/>
+          <a:stretch>
+            <a:fillRect/>
+          </a:stretch>
+        </p:blipFill>
+        <p:spPr bwMode="auto">
+          <a:xfrm>
+            <a:off x="2632304" y="2338196"/>
+            <a:ext cx="1856569" cy="1889420"/>
+          </a:xfrm>
+          <a:prstGeom prst="rect">
+            <a:avLst/>
+          </a:prstGeom>
+          <a:noFill/>
+          <a:extLst>
+            <a:ext uri="{909E8E84-426E-40DD-AFC4-6F175D3DCCD1}">
+              <a14:hiddenFill xmlns:a14="http://schemas.microsoft.com/office/drawing/2010/main">
+                <a:solidFill>
+                  <a:srgbClr val="FFFFFF"/>
+                </a:solidFill>
+              </a14:hiddenFill>
+            </a:ext>
+          </a:extLst>
+        </p:spPr>
+      </p:pic>
+      <p:pic>
+        <p:nvPicPr>
+          <p:cNvPr id="1028" name="Picture 4" descr="https://lh4.googleusercontent.com/zXP8vJUdyx2r9P7iQfdtJruwl-3b9zq75bukq442oftlV5KGhNE9lliPPN3kGHBkr_xQs2Dy6vPa8H9QA07YidJbZk1nJwGHimZaacoxns1Pa7loq9hUtaZWTGQSfdQshLwRm3PlfoTWMwyP-2GyeTb2bw=s2048">
+            <a:extLst>
+              <a:ext uri="{FF2B5EF4-FFF2-40B4-BE49-F238E27FC236}">
+                <a16:creationId xmlns:a16="http://schemas.microsoft.com/office/drawing/2014/main" id="{E6D5D521-1DC3-EB43-B879-527D76B9CACC}"/>
+              </a:ext>
+            </a:extLst>
+          </p:cNvPr>
+          <p:cNvPicPr>
+            <a:picLocks noChangeAspect="1" noChangeArrowheads="1"/>
+          </p:cNvPicPr>
+          <p:nvPr/>
+        </p:nvPicPr>
+        <p:blipFill>
+          <a:blip r:embed="rId4">
+            <a:extLst>
+              <a:ext uri="{28A0092B-C50C-407E-A947-70E740481C1C}">
+                <a14:useLocalDpi xmlns:a14="http://schemas.microsoft.com/office/drawing/2010/main" val="0"/>
+              </a:ext>
+            </a:extLst>
+          </a:blip>
+          <a:srcRect/>
+          <a:stretch>
+            <a:fillRect/>
+          </a:stretch>
+        </p:blipFill>
+        <p:spPr bwMode="auto">
+          <a:xfrm>
+            <a:off x="5549609" y="393243"/>
+            <a:ext cx="5496918" cy="5496918"/>
+          </a:xfrm>
+          <a:prstGeom prst="rect">
+            <a:avLst/>
+          </a:prstGeom>
+          <a:noFill/>
+          <a:extLst>
+            <a:ext uri="{909E8E84-426E-40DD-AFC4-6F175D3DCCD1}">
+              <a14:hiddenFill xmlns:a14="http://schemas.microsoft.com/office/drawing/2010/main">
+                <a:solidFill>
+                  <a:srgbClr val="FFFFFF"/>
+                </a:solidFill>
+              </a14:hiddenFill>
+            </a:ext>
+          </a:extLst>
+        </p:spPr>
+      </p:pic>
+    </p:spTree>
+    <p:extLst>
+      <p:ext uri="{BB962C8B-B14F-4D97-AF65-F5344CB8AC3E}">
+        <p14:creationId xmlns:p14="http://schemas.microsoft.com/office/powerpoint/2010/main" val="2607124379"/>
+      </p:ext>
+    </p:extLst>
+  </p:cSld>
+  <p:clrMapOvr>
+    <a:masterClrMapping/>
+  </p:clrMapOvr>
+</p:sld>
+</file>
+
+<file path=ppt/slides/slide3.xml><?xml version="1.0" encoding="utf-8"?>
+<p:sld xmlns:a="http://schemas.openxmlformats.org/drawingml/2006/main" xmlns:r="http://schemas.openxmlformats.org/officeDocument/2006/relationships" xmlns:p="http://schemas.openxmlformats.org/presentationml/2006/main">
+  <p:cSld>
+    <p:spTree>
+      <p:nvGrpSpPr>
+        <p:cNvPr id="1" name=""/>
+        <p:cNvGrpSpPr/>
+        <p:nvPr/>
+      </p:nvGrpSpPr>
+      <p:grpSpPr>
+        <a:xfrm>
+          <a:off x="0" y="0"/>
+          <a:ext cx="0" cy="0"/>
+          <a:chOff x="0" y="0"/>
+          <a:chExt cx="0" cy="0"/>
+        </a:xfrm>
+      </p:grpSpPr>
+      <p:pic>
+        <p:nvPicPr>
+          <p:cNvPr id="2050" name="Picture 2" descr="https://lh3.googleusercontent.com/HX8p_OVlStmcDg9kd75corbZEEXurwIY1e2KDBwJWm1tXKYEGgD9GrjhHwI0w18VFXjRHGbvik3hJkKxdG4NHndZB83VO7-j5KvtMoBLAwhMWK974k_hWVMNeLF9mfbjAdqRaj8zXHo1K7_c5R5_lFKcJA=s2048">
+            <a:extLst>
+              <a:ext uri="{FF2B5EF4-FFF2-40B4-BE49-F238E27FC236}">
+                <a16:creationId xmlns:a16="http://schemas.microsoft.com/office/drawing/2014/main" id="{BA8A7D8D-C94A-474E-B564-84AFCEDD842F}"/>
+              </a:ext>
+            </a:extLst>
+          </p:cNvPr>
+          <p:cNvPicPr>
+            <a:picLocks noChangeAspect="1" noChangeArrowheads="1"/>
+          </p:cNvPicPr>
+          <p:nvPr/>
+        </p:nvPicPr>
+        <p:blipFill>
+          <a:blip r:embed="rId2">
+            <a:extLst>
+              <a:ext uri="{28A0092B-C50C-407E-A947-70E740481C1C}">
+                <a14:useLocalDpi xmlns:a14="http://schemas.microsoft.com/office/drawing/2010/main" val="0"/>
+              </a:ext>
+            </a:extLst>
+          </a:blip>
+          <a:srcRect/>
+          <a:stretch>
+            <a:fillRect/>
+          </a:stretch>
+        </p:blipFill>
+        <p:spPr bwMode="auto">
+          <a:xfrm>
+            <a:off x="1351647" y="794278"/>
+            <a:ext cx="4172448" cy="4141387"/>
+          </a:xfrm>
+          <a:prstGeom prst="rect">
+            <a:avLst/>
+          </a:prstGeom>
+          <a:noFill/>
+          <a:extLst>
+            <a:ext uri="{909E8E84-426E-40DD-AFC4-6F175D3DCCD1}">
+              <a14:hiddenFill xmlns:a14="http://schemas.microsoft.com/office/drawing/2010/main">
+                <a:solidFill>
+                  <a:srgbClr val="FFFFFF"/>
+                </a:solidFill>
+              </a14:hiddenFill>
+            </a:ext>
+          </a:extLst>
+        </p:spPr>
+      </p:pic>
+      <p:grpSp>
+        <p:nvGrpSpPr>
+          <p:cNvPr id="4" name="Group 3">
+            <a:extLst>
+              <a:ext uri="{FF2B5EF4-FFF2-40B4-BE49-F238E27FC236}">
+                <a16:creationId xmlns:a16="http://schemas.microsoft.com/office/drawing/2014/main" id="{81A950C4-85A6-3247-93D9-6A43956AD438}"/>
+              </a:ext>
+            </a:extLst>
+          </p:cNvPr>
+          <p:cNvGrpSpPr/>
+          <p:nvPr/>
+        </p:nvGrpSpPr>
+        <p:grpSpPr>
+          <a:xfrm>
+            <a:off x="5994009" y="794279"/>
+            <a:ext cx="4141386" cy="4141386"/>
+            <a:chOff x="5910281" y="1893888"/>
+            <a:chExt cx="2923442" cy="2923442"/>
+          </a:xfrm>
+        </p:grpSpPr>
+        <p:pic>
+          <p:nvPicPr>
+            <p:cNvPr id="2052" name="Picture 4" descr="https://lh5.googleusercontent.com/9Ex6PYLdsSksdeny_NBat5elWJ29V8PFn8XYqQ_XDlycm2c4jl87L-H3-d893RAFFtteg2PAW0XdwYvIgjjxw_qZN1reS0WJjNnhtzBKu83Kju6cgmRzdh4cuPE7wRY1IL87t4rDY1GLY-HHdBPJf_wjXw=s2048">
+              <a:extLst>
+                <a:ext uri="{FF2B5EF4-FFF2-40B4-BE49-F238E27FC236}">
+                  <a16:creationId xmlns:a16="http://schemas.microsoft.com/office/drawing/2014/main" id="{A0FB28C5-AD52-5F41-9DA8-7EA3ED66B17E}"/>
+                </a:ext>
+              </a:extLst>
+            </p:cNvPr>
+            <p:cNvPicPr>
+              <a:picLocks noChangeAspect="1" noChangeArrowheads="1"/>
+            </p:cNvPicPr>
+            <p:nvPr/>
+          </p:nvPicPr>
+          <p:blipFill>
+            <a:blip r:embed="rId3">
+              <a:extLst>
+                <a:ext uri="{28A0092B-C50C-407E-A947-70E740481C1C}">
+                  <a14:useLocalDpi xmlns:a14="http://schemas.microsoft.com/office/drawing/2010/main" val="0"/>
+                </a:ext>
+              </a:extLst>
+            </a:blip>
+            <a:srcRect/>
+            <a:stretch>
+              <a:fillRect/>
+            </a:stretch>
+          </p:blipFill>
+          <p:spPr bwMode="auto">
+            <a:xfrm>
+              <a:off x="5910281" y="1893888"/>
+              <a:ext cx="2923442" cy="2923442"/>
+            </a:xfrm>
+            <a:prstGeom prst="rect">
+              <a:avLst/>
+            </a:prstGeom>
+            <a:noFill/>
+            <a:extLst>
+              <a:ext uri="{909E8E84-426E-40DD-AFC4-6F175D3DCCD1}">
+                <a14:hiddenFill xmlns:a14="http://schemas.microsoft.com/office/drawing/2010/main">
+                  <a:solidFill>
+                    <a:srgbClr val="FFFFFF"/>
+                  </a:solidFill>
+                </a14:hiddenFill>
+              </a:ext>
+            </a:extLst>
+          </p:spPr>
+        </p:pic>
+        <p:pic>
+          <p:nvPicPr>
+            <p:cNvPr id="2051" name="Picture 3" descr="https://lh6.googleusercontent.com/FG77Vlrxk9vAwHU5GgkvZ4y_0zvARIOYBya3nlEnmVKYJzfwfWa6Qws7x7RRzoU3aMsDAYDvuvImxCo0-btn0rsE8yRFLi1iYMlyheaX_gXj9u6TRnJqHCfxQhp-0thBYOc_WSBpzS9tg5hmIuqEV6aZhw=s2048">
+              <a:extLst>
+                <a:ext uri="{FF2B5EF4-FFF2-40B4-BE49-F238E27FC236}">
+                  <a16:creationId xmlns:a16="http://schemas.microsoft.com/office/drawing/2014/main" id="{DFC26ADE-2E1D-FA40-83D1-F08FA93F0D12}"/>
+                </a:ext>
+              </a:extLst>
+            </p:cNvPr>
+            <p:cNvPicPr>
+              <a:picLocks noChangeAspect="1" noChangeArrowheads="1"/>
+            </p:cNvPicPr>
+            <p:nvPr/>
+          </p:nvPicPr>
+          <p:blipFill>
+            <a:blip r:embed="rId4">
+              <a:extLst>
+                <a:ext uri="{28A0092B-C50C-407E-A947-70E740481C1C}">
+                  <a14:useLocalDpi xmlns:a14="http://schemas.microsoft.com/office/drawing/2010/main" val="0"/>
+                </a:ext>
+              </a:extLst>
+            </a:blip>
+            <a:srcRect/>
+            <a:stretch>
+              <a:fillRect/>
+            </a:stretch>
+          </p:blipFill>
+          <p:spPr bwMode="auto">
+            <a:xfrm>
+              <a:off x="6798832" y="2192468"/>
+              <a:ext cx="268942" cy="279820"/>
+            </a:xfrm>
+            <a:prstGeom prst="rect">
+              <a:avLst/>
+            </a:prstGeom>
+            <a:noFill/>
+            <a:extLst>
+              <a:ext uri="{909E8E84-426E-40DD-AFC4-6F175D3DCCD1}">
+                <a14:hiddenFill xmlns:a14="http://schemas.microsoft.com/office/drawing/2010/main">
+                  <a:solidFill>
+                    <a:srgbClr val="FFFFFF"/>
+                  </a:solidFill>
+                </a14:hiddenFill>
+              </a:ext>
+            </a:extLst>
+          </p:spPr>
+        </p:pic>
+      </p:grpSp>
+    </p:spTree>
+    <p:extLst>
+      <p:ext uri="{BB962C8B-B14F-4D97-AF65-F5344CB8AC3E}">
+        <p14:creationId xmlns:p14="http://schemas.microsoft.com/office/powerpoint/2010/main" val="207617988"/>
+      </p:ext>
+    </p:extLst>
+  </p:cSld>
+  <p:clrMapOvr>
+    <a:masterClrMapping/>
+  </p:clrMapOvr>
+</p:sld>
+</file>
+
 <file path=ppt/theme/theme1.xml><?xml version="1.0" encoding="utf-8"?>
 <a:theme xmlns:a="http://schemas.openxmlformats.org/drawingml/2006/main" name="Office Theme">
   <a:themeElements>

</xml_diff>

<commit_message>
Update BERN course material
</commit_message>
<xml_diff>
--- a/figures/resources/ome-zarr.pptx
+++ b/figures/resources/ome-zarr.pptx
@@ -6,7 +6,8 @@
   </p:sldMasterIdLst>
   <p:sldIdLst>
     <p:sldId id="256" r:id="rId2"/>
-    <p:sldId id="262" r:id="rId3"/>
+    <p:sldId id="263" r:id="rId3"/>
+    <p:sldId id="262" r:id="rId4"/>
   </p:sldIdLst>
   <p:sldSz cx="12192000" cy="6858000"/>
   <p:notesSz cx="6858000" cy="9144000"/>
@@ -262,7 +263,7 @@
           <a:p>
             <a:fld id="{259F230F-3794-D14A-8559-3E9D41919057}" type="datetimeFigureOut">
               <a:rPr lang="de-DE" smtClean="0"/>
-              <a:t>16.01.25</a:t>
+              <a:t>20.02.25</a:t>
             </a:fld>
             <a:endParaRPr lang="de-DE"/>
           </a:p>
@@ -462,7 +463,7 @@
           <a:p>
             <a:fld id="{259F230F-3794-D14A-8559-3E9D41919057}" type="datetimeFigureOut">
               <a:rPr lang="de-DE" smtClean="0"/>
-              <a:t>16.01.25</a:t>
+              <a:t>20.02.25</a:t>
             </a:fld>
             <a:endParaRPr lang="de-DE"/>
           </a:p>
@@ -672,7 +673,7 @@
           <a:p>
             <a:fld id="{259F230F-3794-D14A-8559-3E9D41919057}" type="datetimeFigureOut">
               <a:rPr lang="de-DE" smtClean="0"/>
-              <a:t>16.01.25</a:t>
+              <a:t>20.02.25</a:t>
             </a:fld>
             <a:endParaRPr lang="de-DE"/>
           </a:p>
@@ -1231,7 +1232,7 @@
           <a:p>
             <a:fld id="{259F230F-3794-D14A-8559-3E9D41919057}" type="datetimeFigureOut">
               <a:rPr lang="de-DE" smtClean="0"/>
-              <a:t>16.01.25</a:t>
+              <a:t>20.02.25</a:t>
             </a:fld>
             <a:endParaRPr lang="de-DE"/>
           </a:p>
@@ -1507,7 +1508,7 @@
           <a:p>
             <a:fld id="{259F230F-3794-D14A-8559-3E9D41919057}" type="datetimeFigureOut">
               <a:rPr lang="de-DE" smtClean="0"/>
-              <a:t>16.01.25</a:t>
+              <a:t>20.02.25</a:t>
             </a:fld>
             <a:endParaRPr lang="de-DE"/>
           </a:p>
@@ -1775,7 +1776,7 @@
           <a:p>
             <a:fld id="{259F230F-3794-D14A-8559-3E9D41919057}" type="datetimeFigureOut">
               <a:rPr lang="de-DE" smtClean="0"/>
-              <a:t>16.01.25</a:t>
+              <a:t>20.02.25</a:t>
             </a:fld>
             <a:endParaRPr lang="de-DE"/>
           </a:p>
@@ -2190,7 +2191,7 @@
           <a:p>
             <a:fld id="{259F230F-3794-D14A-8559-3E9D41919057}" type="datetimeFigureOut">
               <a:rPr lang="de-DE" smtClean="0"/>
-              <a:t>16.01.25</a:t>
+              <a:t>20.02.25</a:t>
             </a:fld>
             <a:endParaRPr lang="de-DE"/>
           </a:p>
@@ -2332,7 +2333,7 @@
           <a:p>
             <a:fld id="{259F230F-3794-D14A-8559-3E9D41919057}" type="datetimeFigureOut">
               <a:rPr lang="de-DE" smtClean="0"/>
-              <a:t>16.01.25</a:t>
+              <a:t>20.02.25</a:t>
             </a:fld>
             <a:endParaRPr lang="de-DE"/>
           </a:p>
@@ -2445,7 +2446,7 @@
           <a:p>
             <a:fld id="{259F230F-3794-D14A-8559-3E9D41919057}" type="datetimeFigureOut">
               <a:rPr lang="de-DE" smtClean="0"/>
-              <a:t>16.01.25</a:t>
+              <a:t>20.02.25</a:t>
             </a:fld>
             <a:endParaRPr lang="de-DE"/>
           </a:p>
@@ -2758,7 +2759,7 @@
           <a:p>
             <a:fld id="{259F230F-3794-D14A-8559-3E9D41919057}" type="datetimeFigureOut">
               <a:rPr lang="de-DE" smtClean="0"/>
-              <a:t>16.01.25</a:t>
+              <a:t>20.02.25</a:t>
             </a:fld>
             <a:endParaRPr lang="de-DE"/>
           </a:p>
@@ -3047,7 +3048,7 @@
           <a:p>
             <a:fld id="{259F230F-3794-D14A-8559-3E9D41919057}" type="datetimeFigureOut">
               <a:rPr lang="de-DE" smtClean="0"/>
-              <a:t>16.01.25</a:t>
+              <a:t>20.02.25</a:t>
             </a:fld>
             <a:endParaRPr lang="de-DE"/>
           </a:p>
@@ -3290,7 +3291,7 @@
           <a:p>
             <a:fld id="{259F230F-3794-D14A-8559-3E9D41919057}" type="datetimeFigureOut">
               <a:rPr lang="de-DE" smtClean="0"/>
-              <a:t>16.01.25</a:t>
+              <a:t>20.02.25</a:t>
             </a:fld>
             <a:endParaRPr lang="de-DE"/>
           </a:p>
@@ -3803,7 +3804,13 @@
   <p:cSld>
     <p:spTree>
       <p:nvGrpSpPr>
-        <p:cNvPr id="1" name=""/>
+        <p:cNvPr id="1" name="">
+          <a:extLst>
+            <a:ext uri="{FF2B5EF4-FFF2-40B4-BE49-F238E27FC236}">
+              <a16:creationId xmlns:a16="http://schemas.microsoft.com/office/drawing/2014/main" id="{31A63E7C-B9EF-E181-9F0C-813D23EBC7D1}"/>
+            </a:ext>
+          </a:extLst>
+        </p:cNvPr>
         <p:cNvGrpSpPr/>
         <p:nvPr/>
       </p:nvGrpSpPr>
@@ -3820,20 +3827,14 @@
           <p:cNvPr id="4" name="Table 3">
             <a:extLst>
               <a:ext uri="{FF2B5EF4-FFF2-40B4-BE49-F238E27FC236}">
-                <a16:creationId xmlns:a16="http://schemas.microsoft.com/office/drawing/2014/main" id="{3DED9775-8AEB-4D01-4DA3-35C5FB7E9C0A}"/>
+                <a16:creationId xmlns:a16="http://schemas.microsoft.com/office/drawing/2014/main" id="{7E338D3A-A120-908F-4705-4DE83B20A9F5}"/>
               </a:ext>
             </a:extLst>
           </p:cNvPr>
           <p:cNvGraphicFramePr>
             <a:graphicFrameLocks noGrp="1"/>
           </p:cNvGraphicFramePr>
-          <p:nvPr>
-            <p:extLst>
-              <p:ext uri="{D42A27DB-BD31-4B8C-83A1-F6EECF244321}">
-                <p14:modId xmlns:p14="http://schemas.microsoft.com/office/powerpoint/2010/main" val="2383090520"/>
-              </p:ext>
-            </p:extLst>
-          </p:nvPr>
+          <p:nvPr/>
         </p:nvGraphicFramePr>
         <p:xfrm>
           <a:off x="5861770" y="756276"/>
@@ -5804,7 +5805,7 @@
           <p:cNvPr id="7" name="TextBox 6">
             <a:extLst>
               <a:ext uri="{FF2B5EF4-FFF2-40B4-BE49-F238E27FC236}">
-                <a16:creationId xmlns:a16="http://schemas.microsoft.com/office/drawing/2014/main" id="{41299504-107E-13F5-5A28-CD9E51AA6F9A}"/>
+                <a16:creationId xmlns:a16="http://schemas.microsoft.com/office/drawing/2014/main" id="{C2F671F0-B281-C373-9C3A-965EB2E09C9B}"/>
               </a:ext>
             </a:extLst>
           </p:cNvPr>
@@ -5813,8 +5814,8 @@
         </p:nvSpPr>
         <p:spPr>
           <a:xfrm>
-            <a:off x="5858635" y="3559176"/>
-            <a:ext cx="2244332" cy="400110"/>
+            <a:off x="5821102" y="3042768"/>
+            <a:ext cx="1258871" cy="1938992"/>
           </a:xfrm>
           <a:prstGeom prst="rect">
             <a:avLst/>
@@ -5832,8 +5833,105 @@
                 <a:latin typeface="Calibri" panose="020F0502020204030204" pitchFamily="34" charset="0"/>
                 <a:cs typeface="Calibri" panose="020F0502020204030204" pitchFamily="34" charset="0"/>
               </a:rPr>
-              <a:t>img_0/resolution_0</a:t>
-            </a:r>
+              <a:t>r0/</a:t>
+            </a:r>
+            <a:r>
+              <a:rPr lang="en-US" sz="2000" dirty="0">
+                <a:highlight>
+                  <a:srgbClr val="FFFF00"/>
+                </a:highlight>
+                <a:latin typeface="Calibri" panose="020F0502020204030204" pitchFamily="34" charset="0"/>
+                <a:cs typeface="Calibri" panose="020F0502020204030204" pitchFamily="34" charset="0"/>
+              </a:rPr>
+              <a:t>chunk0</a:t>
+            </a:r>
+            <a:br>
+              <a:rPr lang="en-US" sz="2000" dirty="0">
+                <a:latin typeface="Calibri" panose="020F0502020204030204" pitchFamily="34" charset="0"/>
+                <a:cs typeface="Calibri" panose="020F0502020204030204" pitchFamily="34" charset="0"/>
+              </a:rPr>
+            </a:br>
+            <a:r>
+              <a:rPr lang="en-US" sz="2000" dirty="0">
+                <a:latin typeface="Calibri" panose="020F0502020204030204" pitchFamily="34" charset="0"/>
+                <a:cs typeface="Calibri" panose="020F0502020204030204" pitchFamily="34" charset="0"/>
+              </a:rPr>
+              <a:t>r0/</a:t>
+            </a:r>
+            <a:r>
+              <a:rPr lang="en-US" sz="2000" dirty="0">
+                <a:highlight>
+                  <a:srgbClr val="FF00FF"/>
+                </a:highlight>
+                <a:latin typeface="Calibri" panose="020F0502020204030204" pitchFamily="34" charset="0"/>
+                <a:cs typeface="Calibri" panose="020F0502020204030204" pitchFamily="34" charset="0"/>
+              </a:rPr>
+              <a:t>chunk0</a:t>
+            </a:r>
+            <a:endParaRPr lang="en-DE" sz="2000" dirty="0">
+              <a:highlight>
+                <a:srgbClr val="FF00FF"/>
+              </a:highlight>
+              <a:latin typeface="Calibri" panose="020F0502020204030204" pitchFamily="34" charset="0"/>
+              <a:cs typeface="Calibri" panose="020F0502020204030204" pitchFamily="34" charset="0"/>
+            </a:endParaRPr>
+          </a:p>
+          <a:p>
+            <a:r>
+              <a:rPr lang="en-US" sz="2000" dirty="0">
+                <a:latin typeface="Calibri" panose="020F0502020204030204" pitchFamily="34" charset="0"/>
+                <a:cs typeface="Calibri" panose="020F0502020204030204" pitchFamily="34" charset="0"/>
+              </a:rPr>
+              <a:t>r0/</a:t>
+            </a:r>
+            <a:r>
+              <a:rPr lang="en-US" sz="2000" dirty="0">
+                <a:highlight>
+                  <a:srgbClr val="FF0000"/>
+                </a:highlight>
+                <a:latin typeface="Calibri" panose="020F0502020204030204" pitchFamily="34" charset="0"/>
+                <a:cs typeface="Calibri" panose="020F0502020204030204" pitchFamily="34" charset="0"/>
+              </a:rPr>
+              <a:t>chunk0</a:t>
+            </a:r>
+            <a:endParaRPr lang="en-DE" sz="2000" dirty="0">
+              <a:highlight>
+                <a:srgbClr val="FF0000"/>
+              </a:highlight>
+              <a:latin typeface="Calibri" panose="020F0502020204030204" pitchFamily="34" charset="0"/>
+              <a:cs typeface="Calibri" panose="020F0502020204030204" pitchFamily="34" charset="0"/>
+            </a:endParaRPr>
+          </a:p>
+          <a:p>
+            <a:r>
+              <a:rPr lang="en-US" sz="2000" dirty="0">
+                <a:latin typeface="Calibri" panose="020F0502020204030204" pitchFamily="34" charset="0"/>
+                <a:cs typeface="Calibri" panose="020F0502020204030204" pitchFamily="34" charset="0"/>
+              </a:rPr>
+              <a:t>r0/</a:t>
+            </a:r>
+            <a:r>
+              <a:rPr lang="en-US" sz="2000" dirty="0">
+                <a:highlight>
+                  <a:srgbClr val="FF0000"/>
+                </a:highlight>
+                <a:latin typeface="Calibri" panose="020F0502020204030204" pitchFamily="34" charset="0"/>
+                <a:cs typeface="Calibri" panose="020F0502020204030204" pitchFamily="34" charset="0"/>
+              </a:rPr>
+              <a:t>chunk0</a:t>
+            </a:r>
+            <a:br>
+              <a:rPr lang="en-US" sz="2000" dirty="0">
+                <a:latin typeface="Calibri" panose="020F0502020204030204" pitchFamily="34" charset="0"/>
+                <a:cs typeface="Calibri" panose="020F0502020204030204" pitchFamily="34" charset="0"/>
+              </a:rPr>
+            </a:br>
+            <a:endParaRPr lang="en-DE" sz="2000" dirty="0">
+              <a:latin typeface="Calibri" panose="020F0502020204030204" pitchFamily="34" charset="0"/>
+              <a:cs typeface="Calibri" panose="020F0502020204030204" pitchFamily="34" charset="0"/>
+            </a:endParaRPr>
+          </a:p>
+          <a:p>
             <a:endParaRPr lang="en-DE" sz="2000" dirty="0">
               <a:latin typeface="Calibri" panose="020F0502020204030204" pitchFamily="34" charset="0"/>
               <a:cs typeface="Calibri" panose="020F0502020204030204" pitchFamily="34" charset="0"/>
@@ -5846,7 +5944,7 @@
           <p:cNvPr id="8" name="Straight Arrow Connector 7">
             <a:extLst>
               <a:ext uri="{FF2B5EF4-FFF2-40B4-BE49-F238E27FC236}">
-                <a16:creationId xmlns:a16="http://schemas.microsoft.com/office/drawing/2014/main" id="{622164C4-EAD7-5060-0959-105521B16517}"/>
+                <a16:creationId xmlns:a16="http://schemas.microsoft.com/office/drawing/2014/main" id="{78686E9C-B4B8-D0B1-EF52-65BFEF3230EA}"/>
               </a:ext>
             </a:extLst>
           </p:cNvPr>
@@ -5890,7 +5988,7 @@
           <p:cNvPr id="10" name="TextBox 9">
             <a:extLst>
               <a:ext uri="{FF2B5EF4-FFF2-40B4-BE49-F238E27FC236}">
-                <a16:creationId xmlns:a16="http://schemas.microsoft.com/office/drawing/2014/main" id="{DF7E9E09-3088-1F60-F0C9-B67D7D6BF9F9}"/>
+                <a16:creationId xmlns:a16="http://schemas.microsoft.com/office/drawing/2014/main" id="{41DDFA37-8C00-86B5-A936-280D380319C3}"/>
               </a:ext>
             </a:extLst>
           </p:cNvPr>
@@ -5939,7 +6037,7 @@
           <p:cNvPr id="11" name="TextBox 10">
             <a:extLst>
               <a:ext uri="{FF2B5EF4-FFF2-40B4-BE49-F238E27FC236}">
-                <a16:creationId xmlns:a16="http://schemas.microsoft.com/office/drawing/2014/main" id="{BC957362-92BF-BFF3-0731-404AC44E15E6}"/>
+                <a16:creationId xmlns:a16="http://schemas.microsoft.com/office/drawing/2014/main" id="{398FCF5D-6C4B-DABC-9DEC-4ED99E1A5CA4}"/>
               </a:ext>
             </a:extLst>
           </p:cNvPr>
@@ -5982,20 +6080,14 @@
           <p:cNvPr id="16" name="Table 15">
             <a:extLst>
               <a:ext uri="{FF2B5EF4-FFF2-40B4-BE49-F238E27FC236}">
-                <a16:creationId xmlns:a16="http://schemas.microsoft.com/office/drawing/2014/main" id="{13615F5B-351B-7AE2-4E48-A37A76BA44AE}"/>
+                <a16:creationId xmlns:a16="http://schemas.microsoft.com/office/drawing/2014/main" id="{FAFEFB19-71A9-E804-C182-4C1392A1522B}"/>
               </a:ext>
             </a:extLst>
           </p:cNvPr>
           <p:cNvGraphicFramePr>
             <a:graphicFrameLocks noGrp="1"/>
           </p:cNvGraphicFramePr>
-          <p:nvPr>
-            <p:extLst>
-              <p:ext uri="{D42A27DB-BD31-4B8C-83A1-F6EECF244321}">
-                <p14:modId xmlns:p14="http://schemas.microsoft.com/office/powerpoint/2010/main" val="3786491410"/>
-              </p:ext>
-            </p:extLst>
-          </p:nvPr>
+          <p:nvPr/>
         </p:nvGraphicFramePr>
         <p:xfrm>
           <a:off x="9839503" y="1260492"/>
@@ -6538,7 +6630,7 @@
           <p:cNvPr id="24" name="TextBox 23">
             <a:extLst>
               <a:ext uri="{FF2B5EF4-FFF2-40B4-BE49-F238E27FC236}">
-                <a16:creationId xmlns:a16="http://schemas.microsoft.com/office/drawing/2014/main" id="{A7EA8C98-B306-DA37-F253-D227AC41095A}"/>
+                <a16:creationId xmlns:a16="http://schemas.microsoft.com/office/drawing/2014/main" id="{B9A6D05B-DA90-A7A6-783C-67A4B59F4EE2}"/>
               </a:ext>
             </a:extLst>
           </p:cNvPr>
@@ -6581,7 +6673,7 @@
           <p:cNvPr id="9" name="TextBox 8">
             <a:extLst>
               <a:ext uri="{FF2B5EF4-FFF2-40B4-BE49-F238E27FC236}">
-                <a16:creationId xmlns:a16="http://schemas.microsoft.com/office/drawing/2014/main" id="{4CD94B79-BC4E-2BF8-F3C2-355BD57CEDC5}"/>
+                <a16:creationId xmlns:a16="http://schemas.microsoft.com/office/drawing/2014/main" id="{A5BE6043-C274-1AED-E3A5-B8D33FB33312}"/>
               </a:ext>
             </a:extLst>
           </p:cNvPr>
@@ -6590,7 +6682,7 @@
         </p:nvSpPr>
         <p:spPr>
           <a:xfrm>
-            <a:off x="5722039" y="4209100"/>
+            <a:off x="5676008" y="4321187"/>
             <a:ext cx="2715868" cy="369332"/>
           </a:xfrm>
           <a:prstGeom prst="rect">
@@ -6623,7 +6715,7 @@
           <p:cNvPr id="13" name="TextBox 12">
             <a:extLst>
               <a:ext uri="{FF2B5EF4-FFF2-40B4-BE49-F238E27FC236}">
-                <a16:creationId xmlns:a16="http://schemas.microsoft.com/office/drawing/2014/main" id="{9C681A5A-3CC8-9A3B-B614-6ADC513347B6}"/>
+                <a16:creationId xmlns:a16="http://schemas.microsoft.com/office/drawing/2014/main" id="{E3664A23-D36E-2F0B-C01C-D5AD0DBB9B99}"/>
               </a:ext>
             </a:extLst>
           </p:cNvPr>
@@ -6665,7 +6757,7 @@
           <p:cNvPr id="17" name="TextBox 16">
             <a:extLst>
               <a:ext uri="{FF2B5EF4-FFF2-40B4-BE49-F238E27FC236}">
-                <a16:creationId xmlns:a16="http://schemas.microsoft.com/office/drawing/2014/main" id="{2303204B-E344-4A0D-D7F0-A739FFE7E2F1}"/>
+                <a16:creationId xmlns:a16="http://schemas.microsoft.com/office/drawing/2014/main" id="{F9A27B0C-6AB9-48D9-EFCC-93AEEB7399B3}"/>
               </a:ext>
             </a:extLst>
           </p:cNvPr>
@@ -6707,7 +6799,7 @@
           <p:cNvPr id="20" name="TextBox 19">
             <a:extLst>
               <a:ext uri="{FF2B5EF4-FFF2-40B4-BE49-F238E27FC236}">
-                <a16:creationId xmlns:a16="http://schemas.microsoft.com/office/drawing/2014/main" id="{ADD83C39-A310-DD8A-6898-15B66E3CB948}"/>
+                <a16:creationId xmlns:a16="http://schemas.microsoft.com/office/drawing/2014/main" id="{B78BF15B-9DA0-9C66-598A-DC4597EF0F5D}"/>
               </a:ext>
             </a:extLst>
           </p:cNvPr>
@@ -6749,7 +6841,7 @@
           <p:cNvPr id="25" name="TextBox 24">
             <a:extLst>
               <a:ext uri="{FF2B5EF4-FFF2-40B4-BE49-F238E27FC236}">
-                <a16:creationId xmlns:a16="http://schemas.microsoft.com/office/drawing/2014/main" id="{11125459-F681-B371-00F6-154725787417}"/>
+                <a16:creationId xmlns:a16="http://schemas.microsoft.com/office/drawing/2014/main" id="{234E3518-7209-56EC-DA44-76426B62FDFC}"/>
               </a:ext>
             </a:extLst>
           </p:cNvPr>
@@ -6791,7 +6883,7 @@
           <p:cNvPr id="26" name="TextBox 25">
             <a:extLst>
               <a:ext uri="{FF2B5EF4-FFF2-40B4-BE49-F238E27FC236}">
-                <a16:creationId xmlns:a16="http://schemas.microsoft.com/office/drawing/2014/main" id="{7772186F-4609-2F3A-70E0-24726ECB0934}"/>
+                <a16:creationId xmlns:a16="http://schemas.microsoft.com/office/drawing/2014/main" id="{69F1A1F0-F50C-7E0B-C8D5-7E1F38525532}"/>
               </a:ext>
             </a:extLst>
           </p:cNvPr>
@@ -6800,8 +6892,8 @@
         </p:nvSpPr>
         <p:spPr>
           <a:xfrm>
-            <a:off x="9068994" y="3559176"/>
-            <a:ext cx="2244332" cy="400110"/>
+            <a:off x="9776300" y="3590355"/>
+            <a:ext cx="1258871" cy="400110"/>
           </a:xfrm>
           <a:prstGeom prst="rect">
             <a:avLst/>
@@ -6819,7 +6911,7 @@
                 <a:latin typeface="Calibri" panose="020F0502020204030204" pitchFamily="34" charset="0"/>
                 <a:cs typeface="Calibri" panose="020F0502020204030204" pitchFamily="34" charset="0"/>
               </a:rPr>
-              <a:t>img_0/resolution_1</a:t>
+              <a:t>r1/chunk0</a:t>
             </a:r>
             <a:endParaRPr lang="en-DE" sz="2000" dirty="0">
               <a:latin typeface="Calibri" panose="020F0502020204030204" pitchFamily="34" charset="0"/>
@@ -6833,7 +6925,7 @@
           <p:cNvPr id="27" name="TextBox 26">
             <a:extLst>
               <a:ext uri="{FF2B5EF4-FFF2-40B4-BE49-F238E27FC236}">
-                <a16:creationId xmlns:a16="http://schemas.microsoft.com/office/drawing/2014/main" id="{0CBA087A-49CC-EE30-DD9D-6A846EFBA201}"/>
+                <a16:creationId xmlns:a16="http://schemas.microsoft.com/office/drawing/2014/main" id="{B7373FD3-FA69-BE47-A621-F67A8CC61A4C}"/>
               </a:ext>
             </a:extLst>
           </p:cNvPr>
@@ -6944,7 +7036,7 @@
           <p:cNvPr id="28" name="TextBox 27">
             <a:extLst>
               <a:ext uri="{FF2B5EF4-FFF2-40B4-BE49-F238E27FC236}">
-                <a16:creationId xmlns:a16="http://schemas.microsoft.com/office/drawing/2014/main" id="{1B0662ED-6854-BA0F-4541-BA06A6D6CD8E}"/>
+                <a16:creationId xmlns:a16="http://schemas.microsoft.com/office/drawing/2014/main" id="{03767D4F-AEDB-49B2-A31D-5F3E2A86DDF2}"/>
               </a:ext>
             </a:extLst>
           </p:cNvPr>
@@ -7058,6 +7150,3366 @@
             <a:endParaRPr lang="en-DE" sz="1200" dirty="0">
               <a:latin typeface="Courier New" panose="02070309020205020404" pitchFamily="49" charset="0"/>
               <a:cs typeface="Courier New" panose="02070309020205020404" pitchFamily="49" charset="0"/>
+            </a:endParaRPr>
+          </a:p>
+        </p:txBody>
+      </p:sp>
+    </p:spTree>
+    <p:extLst>
+      <p:ext uri="{BB962C8B-B14F-4D97-AF65-F5344CB8AC3E}">
+        <p14:creationId xmlns:p14="http://schemas.microsoft.com/office/powerpoint/2010/main" val="1785401432"/>
+      </p:ext>
+    </p:extLst>
+  </p:cSld>
+  <p:clrMapOvr>
+    <a:masterClrMapping/>
+  </p:clrMapOvr>
+</p:sld>
+</file>
+
+<file path=ppt/slides/slide3.xml><?xml version="1.0" encoding="utf-8"?>
+<p:sld xmlns:a="http://schemas.openxmlformats.org/drawingml/2006/main" xmlns:r="http://schemas.openxmlformats.org/officeDocument/2006/relationships" xmlns:p="http://schemas.openxmlformats.org/presentationml/2006/main">
+  <p:cSld>
+    <p:spTree>
+      <p:nvGrpSpPr>
+        <p:cNvPr id="1" name=""/>
+        <p:cNvGrpSpPr/>
+        <p:nvPr/>
+      </p:nvGrpSpPr>
+      <p:grpSpPr>
+        <a:xfrm>
+          <a:off x="0" y="0"/>
+          <a:ext cx="0" cy="0"/>
+          <a:chOff x="0" y="0"/>
+          <a:chExt cx="0" cy="0"/>
+        </a:xfrm>
+      </p:grpSpPr>
+      <p:graphicFrame>
+        <p:nvGraphicFramePr>
+          <p:cNvPr id="4" name="Table 3">
+            <a:extLst>
+              <a:ext uri="{FF2B5EF4-FFF2-40B4-BE49-F238E27FC236}">
+                <a16:creationId xmlns:a16="http://schemas.microsoft.com/office/drawing/2014/main" id="{3DED9775-8AEB-4D01-4DA3-35C5FB7E9C0A}"/>
+              </a:ext>
+            </a:extLst>
+          </p:cNvPr>
+          <p:cNvGraphicFramePr>
+            <a:graphicFrameLocks noGrp="1"/>
+          </p:cNvGraphicFramePr>
+          <p:nvPr>
+            <p:extLst>
+              <p:ext uri="{D42A27DB-BD31-4B8C-83A1-F6EECF244321}">
+                <p14:modId xmlns:p14="http://schemas.microsoft.com/office/powerpoint/2010/main" val="1593320217"/>
+              </p:ext>
+            </p:extLst>
+          </p:nvPr>
+        </p:nvGraphicFramePr>
+        <p:xfrm>
+          <a:off x="5775710" y="928400"/>
+          <a:ext cx="2157600" cy="2069508"/>
+        </p:xfrm>
+        <a:graphic>
+          <a:graphicData uri="http://schemas.openxmlformats.org/drawingml/2006/table">
+            <a:tbl>
+              <a:tblPr/>
+              <a:tblGrid>
+                <a:gridCol w="359600">
+                  <a:extLst>
+                    <a:ext uri="{9D8B030D-6E8A-4147-A177-3AD203B41FA5}">
+                      <a16:colId xmlns:a16="http://schemas.microsoft.com/office/drawing/2014/main" val="520751035"/>
+                    </a:ext>
+                  </a:extLst>
+                </a:gridCol>
+                <a:gridCol w="359600">
+                  <a:extLst>
+                    <a:ext uri="{9D8B030D-6E8A-4147-A177-3AD203B41FA5}">
+                      <a16:colId xmlns:a16="http://schemas.microsoft.com/office/drawing/2014/main" val="162460214"/>
+                    </a:ext>
+                  </a:extLst>
+                </a:gridCol>
+                <a:gridCol w="359600">
+                  <a:extLst>
+                    <a:ext uri="{9D8B030D-6E8A-4147-A177-3AD203B41FA5}">
+                      <a16:colId xmlns:a16="http://schemas.microsoft.com/office/drawing/2014/main" val="3565137725"/>
+                    </a:ext>
+                  </a:extLst>
+                </a:gridCol>
+                <a:gridCol w="359600">
+                  <a:extLst>
+                    <a:ext uri="{9D8B030D-6E8A-4147-A177-3AD203B41FA5}">
+                      <a16:colId xmlns:a16="http://schemas.microsoft.com/office/drawing/2014/main" val="1938937240"/>
+                    </a:ext>
+                  </a:extLst>
+                </a:gridCol>
+                <a:gridCol w="359600">
+                  <a:extLst>
+                    <a:ext uri="{9D8B030D-6E8A-4147-A177-3AD203B41FA5}">
+                      <a16:colId xmlns:a16="http://schemas.microsoft.com/office/drawing/2014/main" val="1031040740"/>
+                    </a:ext>
+                  </a:extLst>
+                </a:gridCol>
+                <a:gridCol w="359600">
+                  <a:extLst>
+                    <a:ext uri="{9D8B030D-6E8A-4147-A177-3AD203B41FA5}">
+                      <a16:colId xmlns:a16="http://schemas.microsoft.com/office/drawing/2014/main" val="3881649973"/>
+                    </a:ext>
+                  </a:extLst>
+                </a:gridCol>
+              </a:tblGrid>
+              <a:tr h="344917">
+                <a:tc>
+                  <a:txBody>
+                    <a:bodyPr/>
+                    <a:lstStyle/>
+                    <a:p>
+                      <a:pPr algn="ctr"/>
+                      <a:endParaRPr lang="en-DE" sz="1600" dirty="0">
+                        <a:highlight>
+                          <a:srgbClr val="FFFF00"/>
+                        </a:highlight>
+                        <a:latin typeface="Courier New" panose="02070309020205020404" pitchFamily="49" charset="0"/>
+                        <a:cs typeface="Courier New" panose="02070309020205020404" pitchFamily="49" charset="0"/>
+                      </a:endParaRPr>
+                    </a:p>
+                  </a:txBody>
+                  <a:tcPr marL="101079" marR="101079" marT="50539" marB="50539" anchor="ctr">
+                    <a:lnL w="12700" cmpd="sng">
+                      <a:solidFill>
+                        <a:schemeClr val="tx1"/>
+                      </a:solidFill>
+                      <a:prstDash val="solid"/>
+                    </a:lnL>
+                    <a:lnR w="12700" cap="flat" cmpd="sng" algn="ctr">
+                      <a:solidFill>
+                        <a:schemeClr val="tx1"/>
+                      </a:solidFill>
+                      <a:prstDash val="solid"/>
+                      <a:round/>
+                      <a:headEnd type="none" w="med" len="med"/>
+                      <a:tailEnd type="none" w="med" len="med"/>
+                    </a:lnR>
+                    <a:lnT w="12700" cmpd="sng">
+                      <a:solidFill>
+                        <a:schemeClr val="tx1"/>
+                      </a:solidFill>
+                      <a:prstDash val="solid"/>
+                    </a:lnT>
+                    <a:lnB w="12700" cmpd="sng">
+                      <a:solidFill>
+                        <a:schemeClr val="tx1"/>
+                      </a:solidFill>
+                      <a:prstDash val="solid"/>
+                    </a:lnB>
+                    <a:solidFill>
+                      <a:srgbClr val="FFFF00"/>
+                    </a:solidFill>
+                  </a:tcPr>
+                </a:tc>
+                <a:tc>
+                  <a:txBody>
+                    <a:bodyPr/>
+                    <a:lstStyle/>
+                    <a:p>
+                      <a:pPr algn="ctr"/>
+                      <a:endParaRPr lang="en-DE" sz="1600" dirty="0">
+                        <a:highlight>
+                          <a:srgbClr val="FFFF00"/>
+                        </a:highlight>
+                        <a:latin typeface="Courier New" panose="02070309020205020404" pitchFamily="49" charset="0"/>
+                        <a:cs typeface="Courier New" panose="02070309020205020404" pitchFamily="49" charset="0"/>
+                      </a:endParaRPr>
+                    </a:p>
+                  </a:txBody>
+                  <a:tcPr marL="101079" marR="101079" marT="50539" marB="50539" anchor="ctr">
+                    <a:lnL w="12700" cmpd="sng">
+                      <a:solidFill>
+                        <a:schemeClr val="tx1"/>
+                      </a:solidFill>
+                      <a:prstDash val="solid"/>
+                    </a:lnL>
+                    <a:lnR w="12700" cap="flat" cmpd="sng" algn="ctr">
+                      <a:solidFill>
+                        <a:schemeClr val="tx1"/>
+                      </a:solidFill>
+                      <a:prstDash val="solid"/>
+                      <a:round/>
+                      <a:headEnd type="none" w="med" len="med"/>
+                      <a:tailEnd type="none" w="med" len="med"/>
+                    </a:lnR>
+                    <a:lnT w="12700" cmpd="sng">
+                      <a:solidFill>
+                        <a:schemeClr val="tx1"/>
+                      </a:solidFill>
+                      <a:prstDash val="solid"/>
+                    </a:lnT>
+                    <a:lnB w="12700" cap="flat" cmpd="sng" algn="ctr">
+                      <a:solidFill>
+                        <a:schemeClr val="tx1"/>
+                      </a:solidFill>
+                      <a:prstDash val="solid"/>
+                      <a:round/>
+                      <a:headEnd type="none" w="med" len="med"/>
+                      <a:tailEnd type="none" w="med" len="med"/>
+                    </a:lnB>
+                    <a:solidFill>
+                      <a:srgbClr val="FFFF00"/>
+                    </a:solidFill>
+                  </a:tcPr>
+                </a:tc>
+                <a:tc>
+                  <a:txBody>
+                    <a:bodyPr/>
+                    <a:lstStyle/>
+                    <a:p>
+                      <a:pPr algn="ctr"/>
+                      <a:endParaRPr lang="en-DE" sz="1600" dirty="0">
+                        <a:highlight>
+                          <a:srgbClr val="FFFF00"/>
+                        </a:highlight>
+                        <a:latin typeface="Courier New" panose="02070309020205020404" pitchFamily="49" charset="0"/>
+                        <a:cs typeface="Courier New" panose="02070309020205020404" pitchFamily="49" charset="0"/>
+                      </a:endParaRPr>
+                    </a:p>
+                  </a:txBody>
+                  <a:tcPr marL="101079" marR="101079" marT="50539" marB="50539" anchor="ctr">
+                    <a:lnL w="12700" cap="flat" cmpd="sng" algn="ctr">
+                      <a:solidFill>
+                        <a:schemeClr val="tx1"/>
+                      </a:solidFill>
+                      <a:prstDash val="solid"/>
+                      <a:round/>
+                      <a:headEnd type="none" w="med" len="med"/>
+                      <a:tailEnd type="none" w="med" len="med"/>
+                    </a:lnL>
+                    <a:lnR w="12700" cap="flat" cmpd="sng" algn="ctr">
+                      <a:solidFill>
+                        <a:schemeClr val="tx1"/>
+                      </a:solidFill>
+                      <a:prstDash val="solid"/>
+                      <a:round/>
+                      <a:headEnd type="none" w="med" len="med"/>
+                      <a:tailEnd type="none" w="med" len="med"/>
+                    </a:lnR>
+                    <a:lnT w="12700" cmpd="sng">
+                      <a:solidFill>
+                        <a:schemeClr val="tx1"/>
+                      </a:solidFill>
+                      <a:prstDash val="solid"/>
+                    </a:lnT>
+                    <a:lnB w="12700" cap="flat" cmpd="sng" algn="ctr">
+                      <a:solidFill>
+                        <a:schemeClr val="tx1"/>
+                      </a:solidFill>
+                      <a:prstDash val="solid"/>
+                      <a:round/>
+                      <a:headEnd type="none" w="med" len="med"/>
+                      <a:tailEnd type="none" w="med" len="med"/>
+                    </a:lnB>
+                    <a:solidFill>
+                      <a:srgbClr val="FFFF00"/>
+                    </a:solidFill>
+                  </a:tcPr>
+                </a:tc>
+                <a:tc>
+                  <a:txBody>
+                    <a:bodyPr/>
+                    <a:lstStyle/>
+                    <a:p>
+                      <a:pPr algn="ctr"/>
+                      <a:endParaRPr lang="en-DE" sz="1600" dirty="0">
+                        <a:latin typeface="Courier New" panose="02070309020205020404" pitchFamily="49" charset="0"/>
+                        <a:cs typeface="Courier New" panose="02070309020205020404" pitchFamily="49" charset="0"/>
+                      </a:endParaRPr>
+                    </a:p>
+                  </a:txBody>
+                  <a:tcPr marL="101079" marR="101079" marT="50539" marB="50539" anchor="ctr">
+                    <a:lnL w="12700" cap="flat" cmpd="sng" algn="ctr">
+                      <a:solidFill>
+                        <a:schemeClr val="tx1"/>
+                      </a:solidFill>
+                      <a:prstDash val="solid"/>
+                      <a:round/>
+                      <a:headEnd type="none" w="med" len="med"/>
+                      <a:tailEnd type="none" w="med" len="med"/>
+                    </a:lnL>
+                    <a:lnR w="12700" cap="flat" cmpd="sng" algn="ctr">
+                      <a:solidFill>
+                        <a:schemeClr val="tx1"/>
+                      </a:solidFill>
+                      <a:prstDash val="solid"/>
+                      <a:round/>
+                      <a:headEnd type="none" w="med" len="med"/>
+                      <a:tailEnd type="none" w="med" len="med"/>
+                    </a:lnR>
+                    <a:lnT w="12700" cmpd="sng">
+                      <a:solidFill>
+                        <a:schemeClr val="tx1"/>
+                      </a:solidFill>
+                      <a:prstDash val="solid"/>
+                    </a:lnT>
+                    <a:lnB w="12700" cap="flat" cmpd="sng" algn="ctr">
+                      <a:solidFill>
+                        <a:schemeClr val="tx1"/>
+                      </a:solidFill>
+                      <a:prstDash val="solid"/>
+                      <a:round/>
+                      <a:headEnd type="none" w="med" len="med"/>
+                      <a:tailEnd type="none" w="med" len="med"/>
+                    </a:lnB>
+                    <a:solidFill>
+                      <a:srgbClr val="FF00FF"/>
+                    </a:solidFill>
+                  </a:tcPr>
+                </a:tc>
+                <a:tc>
+                  <a:txBody>
+                    <a:bodyPr/>
+                    <a:lstStyle/>
+                    <a:p>
+                      <a:pPr algn="ctr"/>
+                      <a:endParaRPr lang="en-DE" sz="1600" dirty="0">
+                        <a:latin typeface="Courier New" panose="02070309020205020404" pitchFamily="49" charset="0"/>
+                        <a:cs typeface="Courier New" panose="02070309020205020404" pitchFamily="49" charset="0"/>
+                      </a:endParaRPr>
+                    </a:p>
+                  </a:txBody>
+                  <a:tcPr marL="101079" marR="101079" marT="50539" marB="50539" anchor="ctr">
+                    <a:lnL w="12700" cmpd="sng">
+                      <a:solidFill>
+                        <a:schemeClr val="tx1"/>
+                      </a:solidFill>
+                      <a:prstDash val="solid"/>
+                    </a:lnL>
+                    <a:lnR w="12700" cap="flat" cmpd="sng" algn="ctr">
+                      <a:solidFill>
+                        <a:schemeClr val="tx1"/>
+                      </a:solidFill>
+                      <a:prstDash val="solid"/>
+                      <a:round/>
+                      <a:headEnd type="none" w="med" len="med"/>
+                      <a:tailEnd type="none" w="med" len="med"/>
+                    </a:lnR>
+                    <a:lnT w="12700" cmpd="sng">
+                      <a:solidFill>
+                        <a:schemeClr val="tx1"/>
+                      </a:solidFill>
+                      <a:prstDash val="solid"/>
+                    </a:lnT>
+                    <a:lnB w="12700" cap="flat" cmpd="sng" algn="ctr">
+                      <a:solidFill>
+                        <a:schemeClr val="tx1"/>
+                      </a:solidFill>
+                      <a:prstDash val="solid"/>
+                      <a:round/>
+                      <a:headEnd type="none" w="med" len="med"/>
+                      <a:tailEnd type="none" w="med" len="med"/>
+                    </a:lnB>
+                    <a:solidFill>
+                      <a:srgbClr val="FF00FF"/>
+                    </a:solidFill>
+                  </a:tcPr>
+                </a:tc>
+                <a:tc>
+                  <a:txBody>
+                    <a:bodyPr/>
+                    <a:lstStyle/>
+                    <a:p>
+                      <a:pPr algn="ctr"/>
+                      <a:endParaRPr lang="en-DE" sz="1600" dirty="0">
+                        <a:latin typeface="Courier New" panose="02070309020205020404" pitchFamily="49" charset="0"/>
+                        <a:cs typeface="Courier New" panose="02070309020205020404" pitchFamily="49" charset="0"/>
+                      </a:endParaRPr>
+                    </a:p>
+                  </a:txBody>
+                  <a:tcPr marL="101079" marR="101079" marT="50539" marB="50539" anchor="ctr">
+                    <a:lnL w="12700" cmpd="sng">
+                      <a:solidFill>
+                        <a:schemeClr val="tx1"/>
+                      </a:solidFill>
+                      <a:prstDash val="solid"/>
+                    </a:lnL>
+                    <a:lnR w="12700" cmpd="sng">
+                      <a:solidFill>
+                        <a:schemeClr val="tx1"/>
+                      </a:solidFill>
+                      <a:prstDash val="solid"/>
+                    </a:lnR>
+                    <a:lnT w="12700" cmpd="sng">
+                      <a:solidFill>
+                        <a:schemeClr val="tx1"/>
+                      </a:solidFill>
+                      <a:prstDash val="solid"/>
+                    </a:lnT>
+                    <a:lnB w="12700" cap="flat" cmpd="sng" algn="ctr">
+                      <a:solidFill>
+                        <a:schemeClr val="tx1"/>
+                      </a:solidFill>
+                      <a:prstDash val="solid"/>
+                      <a:round/>
+                      <a:headEnd type="none" w="med" len="med"/>
+                      <a:tailEnd type="none" w="med" len="med"/>
+                    </a:lnB>
+                    <a:solidFill>
+                      <a:srgbClr val="FF00FF"/>
+                    </a:solidFill>
+                  </a:tcPr>
+                </a:tc>
+                <a:extLst>
+                  <a:ext uri="{0D108BD9-81ED-4DB2-BD59-A6C34878D82A}">
+                    <a16:rowId xmlns:a16="http://schemas.microsoft.com/office/drawing/2014/main" val="3835059969"/>
+                  </a:ext>
+                </a:extLst>
+              </a:tr>
+              <a:tr h="344917">
+                <a:tc>
+                  <a:txBody>
+                    <a:bodyPr/>
+                    <a:lstStyle/>
+                    <a:p>
+                      <a:pPr algn="ctr"/>
+                      <a:endParaRPr lang="en-DE" sz="1600" dirty="0">
+                        <a:highlight>
+                          <a:srgbClr val="FFFF00"/>
+                        </a:highlight>
+                        <a:latin typeface="Courier New" panose="02070309020205020404" pitchFamily="49" charset="0"/>
+                        <a:cs typeface="Courier New" panose="02070309020205020404" pitchFamily="49" charset="0"/>
+                      </a:endParaRPr>
+                    </a:p>
+                  </a:txBody>
+                  <a:tcPr marL="101079" marR="101079" marT="50539" marB="50539" anchor="ctr">
+                    <a:lnL w="12700" cmpd="sng">
+                      <a:solidFill>
+                        <a:schemeClr val="tx1"/>
+                      </a:solidFill>
+                      <a:prstDash val="solid"/>
+                    </a:lnL>
+                    <a:lnR w="12700" cap="flat" cmpd="sng" algn="ctr">
+                      <a:solidFill>
+                        <a:schemeClr val="tx1"/>
+                      </a:solidFill>
+                      <a:prstDash val="solid"/>
+                      <a:round/>
+                      <a:headEnd type="none" w="med" len="med"/>
+                      <a:tailEnd type="none" w="med" len="med"/>
+                    </a:lnR>
+                    <a:lnT w="12700" cap="flat" cmpd="sng" algn="ctr">
+                      <a:solidFill>
+                        <a:schemeClr val="tx1"/>
+                      </a:solidFill>
+                      <a:prstDash val="solid"/>
+                      <a:round/>
+                      <a:headEnd type="none" w="med" len="med"/>
+                      <a:tailEnd type="none" w="med" len="med"/>
+                    </a:lnT>
+                    <a:lnB w="12700" cmpd="sng">
+                      <a:solidFill>
+                        <a:schemeClr val="tx1"/>
+                      </a:solidFill>
+                      <a:prstDash val="solid"/>
+                    </a:lnB>
+                    <a:solidFill>
+                      <a:srgbClr val="FFFF00"/>
+                    </a:solidFill>
+                  </a:tcPr>
+                </a:tc>
+                <a:tc>
+                  <a:txBody>
+                    <a:bodyPr/>
+                    <a:lstStyle/>
+                    <a:p>
+                      <a:pPr algn="ctr"/>
+                      <a:endParaRPr lang="en-DE" sz="1600" dirty="0">
+                        <a:highlight>
+                          <a:srgbClr val="FFFF00"/>
+                        </a:highlight>
+                        <a:latin typeface="Courier New" panose="02070309020205020404" pitchFamily="49" charset="0"/>
+                        <a:cs typeface="Courier New" panose="02070309020205020404" pitchFamily="49" charset="0"/>
+                      </a:endParaRPr>
+                    </a:p>
+                  </a:txBody>
+                  <a:tcPr marL="101079" marR="101079" marT="50539" marB="50539" anchor="ctr">
+                    <a:lnL w="12700" cmpd="sng">
+                      <a:solidFill>
+                        <a:schemeClr val="tx1"/>
+                      </a:solidFill>
+                      <a:prstDash val="solid"/>
+                    </a:lnL>
+                    <a:lnR w="12700" cap="flat" cmpd="sng" algn="ctr">
+                      <a:solidFill>
+                        <a:schemeClr val="tx1"/>
+                      </a:solidFill>
+                      <a:prstDash val="solid"/>
+                      <a:round/>
+                      <a:headEnd type="none" w="med" len="med"/>
+                      <a:tailEnd type="none" w="med" len="med"/>
+                    </a:lnR>
+                    <a:lnT w="12700" cap="flat" cmpd="sng" algn="ctr">
+                      <a:solidFill>
+                        <a:schemeClr val="tx1"/>
+                      </a:solidFill>
+                      <a:prstDash val="solid"/>
+                      <a:round/>
+                      <a:headEnd type="none" w="med" len="med"/>
+                      <a:tailEnd type="none" w="med" len="med"/>
+                    </a:lnT>
+                    <a:lnB w="12700" cap="flat" cmpd="sng" algn="ctr">
+                      <a:solidFill>
+                        <a:schemeClr val="tx1"/>
+                      </a:solidFill>
+                      <a:prstDash val="solid"/>
+                      <a:round/>
+                      <a:headEnd type="none" w="med" len="med"/>
+                      <a:tailEnd type="none" w="med" len="med"/>
+                    </a:lnB>
+                    <a:solidFill>
+                      <a:srgbClr val="FFFF00"/>
+                    </a:solidFill>
+                  </a:tcPr>
+                </a:tc>
+                <a:tc>
+                  <a:txBody>
+                    <a:bodyPr/>
+                    <a:lstStyle/>
+                    <a:p>
+                      <a:pPr algn="ctr"/>
+                      <a:endParaRPr lang="en-DE" sz="1600" dirty="0">
+                        <a:highlight>
+                          <a:srgbClr val="FFFF00"/>
+                        </a:highlight>
+                        <a:latin typeface="Courier New" panose="02070309020205020404" pitchFamily="49" charset="0"/>
+                        <a:cs typeface="Courier New" panose="02070309020205020404" pitchFamily="49" charset="0"/>
+                      </a:endParaRPr>
+                    </a:p>
+                  </a:txBody>
+                  <a:tcPr marL="101079" marR="101079" marT="50539" marB="50539" anchor="ctr">
+                    <a:lnL w="12700" cap="flat" cmpd="sng" algn="ctr">
+                      <a:solidFill>
+                        <a:schemeClr val="tx1"/>
+                      </a:solidFill>
+                      <a:prstDash val="solid"/>
+                      <a:round/>
+                      <a:headEnd type="none" w="med" len="med"/>
+                      <a:tailEnd type="none" w="med" len="med"/>
+                    </a:lnL>
+                    <a:lnR w="12700" cap="flat" cmpd="sng" algn="ctr">
+                      <a:solidFill>
+                        <a:schemeClr val="tx1"/>
+                      </a:solidFill>
+                      <a:prstDash val="solid"/>
+                      <a:round/>
+                      <a:headEnd type="none" w="med" len="med"/>
+                      <a:tailEnd type="none" w="med" len="med"/>
+                    </a:lnR>
+                    <a:lnT w="12700" cap="flat" cmpd="sng" algn="ctr">
+                      <a:solidFill>
+                        <a:schemeClr val="tx1"/>
+                      </a:solidFill>
+                      <a:prstDash val="solid"/>
+                      <a:round/>
+                      <a:headEnd type="none" w="med" len="med"/>
+                      <a:tailEnd type="none" w="med" len="med"/>
+                    </a:lnT>
+                    <a:lnB w="12700" cap="flat" cmpd="sng" algn="ctr">
+                      <a:solidFill>
+                        <a:schemeClr val="tx1"/>
+                      </a:solidFill>
+                      <a:prstDash val="solid"/>
+                      <a:round/>
+                      <a:headEnd type="none" w="med" len="med"/>
+                      <a:tailEnd type="none" w="med" len="med"/>
+                    </a:lnB>
+                    <a:solidFill>
+                      <a:srgbClr val="FFFF00"/>
+                    </a:solidFill>
+                  </a:tcPr>
+                </a:tc>
+                <a:tc>
+                  <a:txBody>
+                    <a:bodyPr/>
+                    <a:lstStyle/>
+                    <a:p>
+                      <a:pPr algn="ctr"/>
+                      <a:endParaRPr lang="en-DE" sz="1600" dirty="0">
+                        <a:latin typeface="Courier New" panose="02070309020205020404" pitchFamily="49" charset="0"/>
+                        <a:cs typeface="Courier New" panose="02070309020205020404" pitchFamily="49" charset="0"/>
+                      </a:endParaRPr>
+                    </a:p>
+                  </a:txBody>
+                  <a:tcPr marL="101079" marR="101079" marT="50539" marB="50539" anchor="ctr">
+                    <a:lnL w="12700" cap="flat" cmpd="sng" algn="ctr">
+                      <a:solidFill>
+                        <a:schemeClr val="tx1"/>
+                      </a:solidFill>
+                      <a:prstDash val="solid"/>
+                      <a:round/>
+                      <a:headEnd type="none" w="med" len="med"/>
+                      <a:tailEnd type="none" w="med" len="med"/>
+                    </a:lnL>
+                    <a:lnR w="12700" cap="flat" cmpd="sng" algn="ctr">
+                      <a:solidFill>
+                        <a:schemeClr val="tx1"/>
+                      </a:solidFill>
+                      <a:prstDash val="solid"/>
+                      <a:round/>
+                      <a:headEnd type="none" w="med" len="med"/>
+                      <a:tailEnd type="none" w="med" len="med"/>
+                    </a:lnR>
+                    <a:lnT w="12700" cap="flat" cmpd="sng" algn="ctr">
+                      <a:solidFill>
+                        <a:schemeClr val="tx1"/>
+                      </a:solidFill>
+                      <a:prstDash val="solid"/>
+                      <a:round/>
+                      <a:headEnd type="none" w="med" len="med"/>
+                      <a:tailEnd type="none" w="med" len="med"/>
+                    </a:lnT>
+                    <a:lnB w="12700" cap="flat" cmpd="sng" algn="ctr">
+                      <a:solidFill>
+                        <a:schemeClr val="tx1"/>
+                      </a:solidFill>
+                      <a:prstDash val="solid"/>
+                      <a:round/>
+                      <a:headEnd type="none" w="med" len="med"/>
+                      <a:tailEnd type="none" w="med" len="med"/>
+                    </a:lnB>
+                    <a:solidFill>
+                      <a:srgbClr val="FF00FF"/>
+                    </a:solidFill>
+                  </a:tcPr>
+                </a:tc>
+                <a:tc>
+                  <a:txBody>
+                    <a:bodyPr/>
+                    <a:lstStyle/>
+                    <a:p>
+                      <a:pPr algn="ctr"/>
+                      <a:endParaRPr lang="en-DE" sz="1600" dirty="0">
+                        <a:latin typeface="Courier New" panose="02070309020205020404" pitchFamily="49" charset="0"/>
+                        <a:cs typeface="Courier New" panose="02070309020205020404" pitchFamily="49" charset="0"/>
+                      </a:endParaRPr>
+                    </a:p>
+                  </a:txBody>
+                  <a:tcPr marL="101079" marR="101079" marT="50539" marB="50539" anchor="ctr">
+                    <a:lnL w="12700" cmpd="sng">
+                      <a:solidFill>
+                        <a:schemeClr val="tx1"/>
+                      </a:solidFill>
+                      <a:prstDash val="solid"/>
+                    </a:lnL>
+                    <a:lnR w="12700" cap="flat" cmpd="sng" algn="ctr">
+                      <a:solidFill>
+                        <a:schemeClr val="tx1"/>
+                      </a:solidFill>
+                      <a:prstDash val="solid"/>
+                      <a:round/>
+                      <a:headEnd type="none" w="med" len="med"/>
+                      <a:tailEnd type="none" w="med" len="med"/>
+                    </a:lnR>
+                    <a:lnT w="12700" cap="flat" cmpd="sng" algn="ctr">
+                      <a:solidFill>
+                        <a:schemeClr val="tx1"/>
+                      </a:solidFill>
+                      <a:prstDash val="solid"/>
+                      <a:round/>
+                      <a:headEnd type="none" w="med" len="med"/>
+                      <a:tailEnd type="none" w="med" len="med"/>
+                    </a:lnT>
+                    <a:lnB w="12700" cap="flat" cmpd="sng" algn="ctr">
+                      <a:solidFill>
+                        <a:schemeClr val="tx1"/>
+                      </a:solidFill>
+                      <a:prstDash val="solid"/>
+                      <a:round/>
+                      <a:headEnd type="none" w="med" len="med"/>
+                      <a:tailEnd type="none" w="med" len="med"/>
+                    </a:lnB>
+                    <a:solidFill>
+                      <a:srgbClr val="FF00FF"/>
+                    </a:solidFill>
+                  </a:tcPr>
+                </a:tc>
+                <a:tc>
+                  <a:txBody>
+                    <a:bodyPr/>
+                    <a:lstStyle/>
+                    <a:p>
+                      <a:pPr algn="ctr"/>
+                      <a:endParaRPr lang="en-DE" sz="1600" dirty="0">
+                        <a:latin typeface="Courier New" panose="02070309020205020404" pitchFamily="49" charset="0"/>
+                        <a:cs typeface="Courier New" panose="02070309020205020404" pitchFamily="49" charset="0"/>
+                      </a:endParaRPr>
+                    </a:p>
+                  </a:txBody>
+                  <a:tcPr marL="101079" marR="101079" marT="50539" marB="50539" anchor="ctr">
+                    <a:lnL w="12700" cmpd="sng">
+                      <a:solidFill>
+                        <a:schemeClr val="tx1"/>
+                      </a:solidFill>
+                      <a:prstDash val="solid"/>
+                    </a:lnL>
+                    <a:lnR w="12700" cmpd="sng">
+                      <a:solidFill>
+                        <a:schemeClr val="tx1"/>
+                      </a:solidFill>
+                      <a:prstDash val="solid"/>
+                    </a:lnR>
+                    <a:lnT w="12700" cap="flat" cmpd="sng" algn="ctr">
+                      <a:solidFill>
+                        <a:schemeClr val="tx1"/>
+                      </a:solidFill>
+                      <a:prstDash val="solid"/>
+                      <a:round/>
+                      <a:headEnd type="none" w="med" len="med"/>
+                      <a:tailEnd type="none" w="med" len="med"/>
+                    </a:lnT>
+                    <a:lnB w="12700" cap="flat" cmpd="sng" algn="ctr">
+                      <a:solidFill>
+                        <a:schemeClr val="tx1"/>
+                      </a:solidFill>
+                      <a:prstDash val="solid"/>
+                      <a:round/>
+                      <a:headEnd type="none" w="med" len="med"/>
+                      <a:tailEnd type="none" w="med" len="med"/>
+                    </a:lnB>
+                    <a:solidFill>
+                      <a:srgbClr val="FF00FF"/>
+                    </a:solidFill>
+                  </a:tcPr>
+                </a:tc>
+                <a:extLst>
+                  <a:ext uri="{0D108BD9-81ED-4DB2-BD59-A6C34878D82A}">
+                    <a16:rowId xmlns:a16="http://schemas.microsoft.com/office/drawing/2014/main" val="3477651988"/>
+                  </a:ext>
+                </a:extLst>
+              </a:tr>
+              <a:tr h="344917">
+                <a:tc>
+                  <a:txBody>
+                    <a:bodyPr/>
+                    <a:lstStyle/>
+                    <a:p>
+                      <a:pPr algn="ctr"/>
+                      <a:endParaRPr lang="en-DE" sz="1600" dirty="0">
+                        <a:highlight>
+                          <a:srgbClr val="FFFF00"/>
+                        </a:highlight>
+                        <a:latin typeface="Courier New" panose="02070309020205020404" pitchFamily="49" charset="0"/>
+                        <a:cs typeface="Courier New" panose="02070309020205020404" pitchFamily="49" charset="0"/>
+                      </a:endParaRPr>
+                    </a:p>
+                  </a:txBody>
+                  <a:tcPr marL="101079" marR="101079" marT="50539" marB="50539" anchor="ctr">
+                    <a:lnL w="12700" cmpd="sng">
+                      <a:solidFill>
+                        <a:schemeClr val="tx1"/>
+                      </a:solidFill>
+                      <a:prstDash val="solid"/>
+                    </a:lnL>
+                    <a:lnR w="12700" cap="flat" cmpd="sng" algn="ctr">
+                      <a:solidFill>
+                        <a:schemeClr val="tx1"/>
+                      </a:solidFill>
+                      <a:prstDash val="solid"/>
+                      <a:round/>
+                      <a:headEnd type="none" w="med" len="med"/>
+                      <a:tailEnd type="none" w="med" len="med"/>
+                    </a:lnR>
+                    <a:lnT w="12700" cap="flat" cmpd="sng" algn="ctr">
+                      <a:solidFill>
+                        <a:schemeClr val="tx1"/>
+                      </a:solidFill>
+                      <a:prstDash val="solid"/>
+                      <a:round/>
+                      <a:headEnd type="none" w="med" len="med"/>
+                      <a:tailEnd type="none" w="med" len="med"/>
+                    </a:lnT>
+                    <a:lnB w="12700" cap="flat" cmpd="sng" algn="ctr">
+                      <a:solidFill>
+                        <a:schemeClr val="tx1"/>
+                      </a:solidFill>
+                      <a:prstDash val="solid"/>
+                      <a:round/>
+                      <a:headEnd type="none" w="med" len="med"/>
+                      <a:tailEnd type="none" w="med" len="med"/>
+                    </a:lnB>
+                    <a:solidFill>
+                      <a:srgbClr val="FFFF00"/>
+                    </a:solidFill>
+                  </a:tcPr>
+                </a:tc>
+                <a:tc>
+                  <a:txBody>
+                    <a:bodyPr/>
+                    <a:lstStyle/>
+                    <a:p>
+                      <a:pPr algn="ctr"/>
+                      <a:endParaRPr lang="en-DE" sz="1600" dirty="0">
+                        <a:highlight>
+                          <a:srgbClr val="FFFF00"/>
+                        </a:highlight>
+                        <a:latin typeface="Courier New" panose="02070309020205020404" pitchFamily="49" charset="0"/>
+                        <a:cs typeface="Courier New" panose="02070309020205020404" pitchFamily="49" charset="0"/>
+                      </a:endParaRPr>
+                    </a:p>
+                  </a:txBody>
+                  <a:tcPr marL="101079" marR="101079" marT="50539" marB="50539" anchor="ctr">
+                    <a:lnL w="12700" cmpd="sng">
+                      <a:solidFill>
+                        <a:schemeClr val="tx1"/>
+                      </a:solidFill>
+                      <a:prstDash val="solid"/>
+                    </a:lnL>
+                    <a:lnR w="12700" cap="flat" cmpd="sng" algn="ctr">
+                      <a:solidFill>
+                        <a:schemeClr val="tx1"/>
+                      </a:solidFill>
+                      <a:prstDash val="solid"/>
+                      <a:round/>
+                      <a:headEnd type="none" w="med" len="med"/>
+                      <a:tailEnd type="none" w="med" len="med"/>
+                    </a:lnR>
+                    <a:lnT w="12700" cap="flat" cmpd="sng" algn="ctr">
+                      <a:solidFill>
+                        <a:schemeClr val="tx1"/>
+                      </a:solidFill>
+                      <a:prstDash val="solid"/>
+                      <a:round/>
+                      <a:headEnd type="none" w="med" len="med"/>
+                      <a:tailEnd type="none" w="med" len="med"/>
+                    </a:lnT>
+                    <a:lnB w="12700" cap="flat" cmpd="sng" algn="ctr">
+                      <a:solidFill>
+                        <a:schemeClr val="tx1"/>
+                      </a:solidFill>
+                      <a:prstDash val="solid"/>
+                      <a:round/>
+                      <a:headEnd type="none" w="med" len="med"/>
+                      <a:tailEnd type="none" w="med" len="med"/>
+                    </a:lnB>
+                    <a:solidFill>
+                      <a:srgbClr val="FFFF00"/>
+                    </a:solidFill>
+                  </a:tcPr>
+                </a:tc>
+                <a:tc>
+                  <a:txBody>
+                    <a:bodyPr/>
+                    <a:lstStyle/>
+                    <a:p>
+                      <a:pPr algn="ctr"/>
+                      <a:endParaRPr lang="en-DE" sz="1600" dirty="0">
+                        <a:highlight>
+                          <a:srgbClr val="FFFF00"/>
+                        </a:highlight>
+                        <a:latin typeface="Courier New" panose="02070309020205020404" pitchFamily="49" charset="0"/>
+                        <a:cs typeface="Courier New" panose="02070309020205020404" pitchFamily="49" charset="0"/>
+                      </a:endParaRPr>
+                    </a:p>
+                  </a:txBody>
+                  <a:tcPr marL="101079" marR="101079" marT="50539" marB="50539" anchor="ctr">
+                    <a:lnL w="12700" cap="flat" cmpd="sng" algn="ctr">
+                      <a:solidFill>
+                        <a:schemeClr val="tx1"/>
+                      </a:solidFill>
+                      <a:prstDash val="solid"/>
+                      <a:round/>
+                      <a:headEnd type="none" w="med" len="med"/>
+                      <a:tailEnd type="none" w="med" len="med"/>
+                    </a:lnL>
+                    <a:lnR w="12700" cap="flat" cmpd="sng" algn="ctr">
+                      <a:solidFill>
+                        <a:schemeClr val="tx1"/>
+                      </a:solidFill>
+                      <a:prstDash val="solid"/>
+                      <a:round/>
+                      <a:headEnd type="none" w="med" len="med"/>
+                      <a:tailEnd type="none" w="med" len="med"/>
+                    </a:lnR>
+                    <a:lnT w="12700" cap="flat" cmpd="sng" algn="ctr">
+                      <a:solidFill>
+                        <a:schemeClr val="tx1"/>
+                      </a:solidFill>
+                      <a:prstDash val="solid"/>
+                      <a:round/>
+                      <a:headEnd type="none" w="med" len="med"/>
+                      <a:tailEnd type="none" w="med" len="med"/>
+                    </a:lnT>
+                    <a:lnB w="12700" cap="flat" cmpd="sng" algn="ctr">
+                      <a:solidFill>
+                        <a:schemeClr val="tx1"/>
+                      </a:solidFill>
+                      <a:prstDash val="solid"/>
+                      <a:round/>
+                      <a:headEnd type="none" w="med" len="med"/>
+                      <a:tailEnd type="none" w="med" len="med"/>
+                    </a:lnB>
+                    <a:solidFill>
+                      <a:srgbClr val="FFFF00"/>
+                    </a:solidFill>
+                  </a:tcPr>
+                </a:tc>
+                <a:tc>
+                  <a:txBody>
+                    <a:bodyPr/>
+                    <a:lstStyle/>
+                    <a:p>
+                      <a:pPr algn="ctr"/>
+                      <a:endParaRPr lang="en-DE" sz="1600" dirty="0">
+                        <a:latin typeface="Courier New" panose="02070309020205020404" pitchFamily="49" charset="0"/>
+                        <a:cs typeface="Courier New" panose="02070309020205020404" pitchFamily="49" charset="0"/>
+                      </a:endParaRPr>
+                    </a:p>
+                  </a:txBody>
+                  <a:tcPr marL="101079" marR="101079" marT="50539" marB="50539" anchor="ctr">
+                    <a:lnL w="12700" cap="flat" cmpd="sng" algn="ctr">
+                      <a:solidFill>
+                        <a:schemeClr val="tx1"/>
+                      </a:solidFill>
+                      <a:prstDash val="solid"/>
+                      <a:round/>
+                      <a:headEnd type="none" w="med" len="med"/>
+                      <a:tailEnd type="none" w="med" len="med"/>
+                    </a:lnL>
+                    <a:lnR w="12700" cap="flat" cmpd="sng" algn="ctr">
+                      <a:solidFill>
+                        <a:schemeClr val="tx1"/>
+                      </a:solidFill>
+                      <a:prstDash val="solid"/>
+                      <a:round/>
+                      <a:headEnd type="none" w="med" len="med"/>
+                      <a:tailEnd type="none" w="med" len="med"/>
+                    </a:lnR>
+                    <a:lnT w="12700" cap="flat" cmpd="sng" algn="ctr">
+                      <a:solidFill>
+                        <a:schemeClr val="tx1"/>
+                      </a:solidFill>
+                      <a:prstDash val="solid"/>
+                      <a:round/>
+                      <a:headEnd type="none" w="med" len="med"/>
+                      <a:tailEnd type="none" w="med" len="med"/>
+                    </a:lnT>
+                    <a:lnB w="12700" cap="flat" cmpd="sng" algn="ctr">
+                      <a:solidFill>
+                        <a:schemeClr val="tx1"/>
+                      </a:solidFill>
+                      <a:prstDash val="solid"/>
+                      <a:round/>
+                      <a:headEnd type="none" w="med" len="med"/>
+                      <a:tailEnd type="none" w="med" len="med"/>
+                    </a:lnB>
+                    <a:solidFill>
+                      <a:srgbClr val="FF00FF"/>
+                    </a:solidFill>
+                  </a:tcPr>
+                </a:tc>
+                <a:tc>
+                  <a:txBody>
+                    <a:bodyPr/>
+                    <a:lstStyle/>
+                    <a:p>
+                      <a:pPr algn="ctr"/>
+                      <a:endParaRPr lang="en-DE" sz="1600" dirty="0">
+                        <a:latin typeface="Courier New" panose="02070309020205020404" pitchFamily="49" charset="0"/>
+                        <a:cs typeface="Courier New" panose="02070309020205020404" pitchFamily="49" charset="0"/>
+                      </a:endParaRPr>
+                    </a:p>
+                  </a:txBody>
+                  <a:tcPr marL="101079" marR="101079" marT="50539" marB="50539" anchor="ctr">
+                    <a:lnL w="12700" cmpd="sng">
+                      <a:solidFill>
+                        <a:schemeClr val="tx1"/>
+                      </a:solidFill>
+                      <a:prstDash val="solid"/>
+                    </a:lnL>
+                    <a:lnR w="12700" cap="flat" cmpd="sng" algn="ctr">
+                      <a:solidFill>
+                        <a:schemeClr val="tx1"/>
+                      </a:solidFill>
+                      <a:prstDash val="solid"/>
+                      <a:round/>
+                      <a:headEnd type="none" w="med" len="med"/>
+                      <a:tailEnd type="none" w="med" len="med"/>
+                    </a:lnR>
+                    <a:lnT w="12700" cap="flat" cmpd="sng" algn="ctr">
+                      <a:solidFill>
+                        <a:schemeClr val="tx1"/>
+                      </a:solidFill>
+                      <a:prstDash val="solid"/>
+                      <a:round/>
+                      <a:headEnd type="none" w="med" len="med"/>
+                      <a:tailEnd type="none" w="med" len="med"/>
+                    </a:lnT>
+                    <a:lnB w="12700" cap="flat" cmpd="sng" algn="ctr">
+                      <a:solidFill>
+                        <a:schemeClr val="tx1"/>
+                      </a:solidFill>
+                      <a:prstDash val="solid"/>
+                      <a:round/>
+                      <a:headEnd type="none" w="med" len="med"/>
+                      <a:tailEnd type="none" w="med" len="med"/>
+                    </a:lnB>
+                    <a:solidFill>
+                      <a:srgbClr val="FF00FF"/>
+                    </a:solidFill>
+                  </a:tcPr>
+                </a:tc>
+                <a:tc>
+                  <a:txBody>
+                    <a:bodyPr/>
+                    <a:lstStyle/>
+                    <a:p>
+                      <a:pPr algn="ctr"/>
+                      <a:endParaRPr lang="en-DE" sz="1600" dirty="0">
+                        <a:latin typeface="Courier New" panose="02070309020205020404" pitchFamily="49" charset="0"/>
+                        <a:cs typeface="Courier New" panose="02070309020205020404" pitchFamily="49" charset="0"/>
+                      </a:endParaRPr>
+                    </a:p>
+                  </a:txBody>
+                  <a:tcPr marL="101079" marR="101079" marT="50539" marB="50539" anchor="ctr">
+                    <a:lnL w="12700" cmpd="sng">
+                      <a:solidFill>
+                        <a:schemeClr val="tx1"/>
+                      </a:solidFill>
+                      <a:prstDash val="solid"/>
+                    </a:lnL>
+                    <a:lnR w="12700" cmpd="sng">
+                      <a:solidFill>
+                        <a:schemeClr val="tx1"/>
+                      </a:solidFill>
+                      <a:prstDash val="solid"/>
+                    </a:lnR>
+                    <a:lnT w="12700" cap="flat" cmpd="sng" algn="ctr">
+                      <a:solidFill>
+                        <a:schemeClr val="tx1"/>
+                      </a:solidFill>
+                      <a:prstDash val="solid"/>
+                      <a:round/>
+                      <a:headEnd type="none" w="med" len="med"/>
+                      <a:tailEnd type="none" w="med" len="med"/>
+                    </a:lnT>
+                    <a:lnB w="12700" cap="flat" cmpd="sng" algn="ctr">
+                      <a:solidFill>
+                        <a:schemeClr val="tx1"/>
+                      </a:solidFill>
+                      <a:prstDash val="solid"/>
+                      <a:round/>
+                      <a:headEnd type="none" w="med" len="med"/>
+                      <a:tailEnd type="none" w="med" len="med"/>
+                    </a:lnB>
+                    <a:solidFill>
+                      <a:srgbClr val="FF00FF"/>
+                    </a:solidFill>
+                  </a:tcPr>
+                </a:tc>
+                <a:extLst>
+                  <a:ext uri="{0D108BD9-81ED-4DB2-BD59-A6C34878D82A}">
+                    <a16:rowId xmlns:a16="http://schemas.microsoft.com/office/drawing/2014/main" val="2002121677"/>
+                  </a:ext>
+                </a:extLst>
+              </a:tr>
+              <a:tr h="344917">
+                <a:tc>
+                  <a:txBody>
+                    <a:bodyPr/>
+                    <a:lstStyle/>
+                    <a:p>
+                      <a:pPr algn="ctr"/>
+                      <a:endParaRPr lang="en-DE" sz="1600" dirty="0">
+                        <a:latin typeface="Courier New" panose="02070309020205020404" pitchFamily="49" charset="0"/>
+                        <a:cs typeface="Courier New" panose="02070309020205020404" pitchFamily="49" charset="0"/>
+                      </a:endParaRPr>
+                    </a:p>
+                  </a:txBody>
+                  <a:tcPr marL="101079" marR="101079" marT="50539" marB="50539" anchor="ctr">
+                    <a:lnL w="12700" cmpd="sng">
+                      <a:solidFill>
+                        <a:schemeClr val="tx1"/>
+                      </a:solidFill>
+                      <a:prstDash val="solid"/>
+                    </a:lnL>
+                    <a:lnR w="12700" cap="flat" cmpd="sng" algn="ctr">
+                      <a:solidFill>
+                        <a:schemeClr val="tx1"/>
+                      </a:solidFill>
+                      <a:prstDash val="solid"/>
+                      <a:round/>
+                      <a:headEnd type="none" w="med" len="med"/>
+                      <a:tailEnd type="none" w="med" len="med"/>
+                    </a:lnR>
+                    <a:lnT w="12700" cap="flat" cmpd="sng" algn="ctr">
+                      <a:solidFill>
+                        <a:schemeClr val="tx1"/>
+                      </a:solidFill>
+                      <a:prstDash val="solid"/>
+                      <a:round/>
+                      <a:headEnd type="none" w="med" len="med"/>
+                      <a:tailEnd type="none" w="med" len="med"/>
+                    </a:lnT>
+                    <a:lnB w="12700" cap="flat" cmpd="sng" algn="ctr">
+                      <a:solidFill>
+                        <a:schemeClr val="tx1"/>
+                      </a:solidFill>
+                      <a:prstDash val="solid"/>
+                      <a:round/>
+                      <a:headEnd type="none" w="med" len="med"/>
+                      <a:tailEnd type="none" w="med" len="med"/>
+                    </a:lnB>
+                    <a:solidFill>
+                      <a:srgbClr val="FF0001"/>
+                    </a:solidFill>
+                  </a:tcPr>
+                </a:tc>
+                <a:tc>
+                  <a:txBody>
+                    <a:bodyPr/>
+                    <a:lstStyle/>
+                    <a:p>
+                      <a:pPr algn="ctr"/>
+                      <a:endParaRPr lang="en-DE" sz="1600" dirty="0">
+                        <a:latin typeface="Courier New" panose="02070309020205020404" pitchFamily="49" charset="0"/>
+                        <a:cs typeface="Courier New" panose="02070309020205020404" pitchFamily="49" charset="0"/>
+                      </a:endParaRPr>
+                    </a:p>
+                  </a:txBody>
+                  <a:tcPr marL="101079" marR="101079" marT="50539" marB="50539" anchor="ctr">
+                    <a:lnL w="12700" cap="flat" cmpd="sng" algn="ctr">
+                      <a:solidFill>
+                        <a:schemeClr val="tx1"/>
+                      </a:solidFill>
+                      <a:prstDash val="solid"/>
+                      <a:round/>
+                      <a:headEnd type="none" w="med" len="med"/>
+                      <a:tailEnd type="none" w="med" len="med"/>
+                    </a:lnL>
+                    <a:lnR w="12700" cap="flat" cmpd="sng" algn="ctr">
+                      <a:solidFill>
+                        <a:schemeClr val="tx1"/>
+                      </a:solidFill>
+                      <a:prstDash val="solid"/>
+                      <a:round/>
+                      <a:headEnd type="none" w="med" len="med"/>
+                      <a:tailEnd type="none" w="med" len="med"/>
+                    </a:lnR>
+                    <a:lnT w="12700" cap="flat" cmpd="sng" algn="ctr">
+                      <a:solidFill>
+                        <a:schemeClr val="tx1"/>
+                      </a:solidFill>
+                      <a:prstDash val="solid"/>
+                      <a:round/>
+                      <a:headEnd type="none" w="med" len="med"/>
+                      <a:tailEnd type="none" w="med" len="med"/>
+                    </a:lnT>
+                    <a:lnB w="12700" cap="flat" cmpd="sng" algn="ctr">
+                      <a:solidFill>
+                        <a:schemeClr val="tx1"/>
+                      </a:solidFill>
+                      <a:prstDash val="solid"/>
+                      <a:round/>
+                      <a:headEnd type="none" w="med" len="med"/>
+                      <a:tailEnd type="none" w="med" len="med"/>
+                    </a:lnB>
+                    <a:solidFill>
+                      <a:srgbClr val="FF0001"/>
+                    </a:solidFill>
+                  </a:tcPr>
+                </a:tc>
+                <a:tc>
+                  <a:txBody>
+                    <a:bodyPr/>
+                    <a:lstStyle/>
+                    <a:p>
+                      <a:pPr algn="ctr"/>
+                      <a:endParaRPr lang="en-DE" sz="1600" dirty="0">
+                        <a:latin typeface="Courier New" panose="02070309020205020404" pitchFamily="49" charset="0"/>
+                        <a:cs typeface="Courier New" panose="02070309020205020404" pitchFamily="49" charset="0"/>
+                      </a:endParaRPr>
+                    </a:p>
+                  </a:txBody>
+                  <a:tcPr marL="101079" marR="101079" marT="50539" marB="50539" anchor="ctr">
+                    <a:lnL w="12700" cap="flat" cmpd="sng" algn="ctr">
+                      <a:solidFill>
+                        <a:schemeClr val="tx1"/>
+                      </a:solidFill>
+                      <a:prstDash val="solid"/>
+                      <a:round/>
+                      <a:headEnd type="none" w="med" len="med"/>
+                      <a:tailEnd type="none" w="med" len="med"/>
+                    </a:lnL>
+                    <a:lnR w="12700" cap="flat" cmpd="sng" algn="ctr">
+                      <a:solidFill>
+                        <a:schemeClr val="tx1"/>
+                      </a:solidFill>
+                      <a:prstDash val="solid"/>
+                      <a:round/>
+                      <a:headEnd type="none" w="med" len="med"/>
+                      <a:tailEnd type="none" w="med" len="med"/>
+                    </a:lnR>
+                    <a:lnT w="12700" cap="flat" cmpd="sng" algn="ctr">
+                      <a:solidFill>
+                        <a:schemeClr val="tx1"/>
+                      </a:solidFill>
+                      <a:prstDash val="solid"/>
+                      <a:round/>
+                      <a:headEnd type="none" w="med" len="med"/>
+                      <a:tailEnd type="none" w="med" len="med"/>
+                    </a:lnT>
+                    <a:lnB w="12700" cap="flat" cmpd="sng" algn="ctr">
+                      <a:solidFill>
+                        <a:schemeClr val="tx1"/>
+                      </a:solidFill>
+                      <a:prstDash val="solid"/>
+                      <a:round/>
+                      <a:headEnd type="none" w="med" len="med"/>
+                      <a:tailEnd type="none" w="med" len="med"/>
+                    </a:lnB>
+                    <a:solidFill>
+                      <a:srgbClr val="FF0001"/>
+                    </a:solidFill>
+                  </a:tcPr>
+                </a:tc>
+                <a:tc>
+                  <a:txBody>
+                    <a:bodyPr/>
+                    <a:lstStyle/>
+                    <a:p>
+                      <a:pPr algn="ctr"/>
+                      <a:endParaRPr lang="en-DE" sz="1600" dirty="0">
+                        <a:latin typeface="Courier New" panose="02070309020205020404" pitchFamily="49" charset="0"/>
+                        <a:cs typeface="Courier New" panose="02070309020205020404" pitchFamily="49" charset="0"/>
+                      </a:endParaRPr>
+                    </a:p>
+                  </a:txBody>
+                  <a:tcPr marL="101079" marR="101079" marT="50539" marB="50539" anchor="ctr">
+                    <a:lnL w="12700" cap="flat" cmpd="sng" algn="ctr">
+                      <a:solidFill>
+                        <a:schemeClr val="tx1"/>
+                      </a:solidFill>
+                      <a:prstDash val="solid"/>
+                      <a:round/>
+                      <a:headEnd type="none" w="med" len="med"/>
+                      <a:tailEnd type="none" w="med" len="med"/>
+                    </a:lnL>
+                    <a:lnR w="12700" cap="flat" cmpd="sng" algn="ctr">
+                      <a:solidFill>
+                        <a:schemeClr val="tx1"/>
+                      </a:solidFill>
+                      <a:prstDash val="solid"/>
+                      <a:round/>
+                      <a:headEnd type="none" w="med" len="med"/>
+                      <a:tailEnd type="none" w="med" len="med"/>
+                    </a:lnR>
+                    <a:lnT w="12700" cap="flat" cmpd="sng" algn="ctr">
+                      <a:solidFill>
+                        <a:schemeClr val="tx1"/>
+                      </a:solidFill>
+                      <a:prstDash val="solid"/>
+                      <a:round/>
+                      <a:headEnd type="none" w="med" len="med"/>
+                      <a:tailEnd type="none" w="med" len="med"/>
+                    </a:lnT>
+                    <a:lnB w="12700" cap="flat" cmpd="sng" algn="ctr">
+                      <a:solidFill>
+                        <a:schemeClr val="tx1"/>
+                      </a:solidFill>
+                      <a:prstDash val="solid"/>
+                      <a:round/>
+                      <a:headEnd type="none" w="med" len="med"/>
+                      <a:tailEnd type="none" w="med" len="med"/>
+                    </a:lnB>
+                    <a:solidFill>
+                      <a:srgbClr val="808001"/>
+                    </a:solidFill>
+                  </a:tcPr>
+                </a:tc>
+                <a:tc>
+                  <a:txBody>
+                    <a:bodyPr/>
+                    <a:lstStyle/>
+                    <a:p>
+                      <a:pPr algn="ctr"/>
+                      <a:endParaRPr lang="en-DE" sz="1600" dirty="0">
+                        <a:latin typeface="Courier New" panose="02070309020205020404" pitchFamily="49" charset="0"/>
+                        <a:cs typeface="Courier New" panose="02070309020205020404" pitchFamily="49" charset="0"/>
+                      </a:endParaRPr>
+                    </a:p>
+                  </a:txBody>
+                  <a:tcPr marL="101079" marR="101079" marT="50539" marB="50539" anchor="ctr">
+                    <a:lnL w="12700" cap="flat" cmpd="sng" algn="ctr">
+                      <a:solidFill>
+                        <a:schemeClr val="tx1"/>
+                      </a:solidFill>
+                      <a:prstDash val="solid"/>
+                      <a:round/>
+                      <a:headEnd type="none" w="med" len="med"/>
+                      <a:tailEnd type="none" w="med" len="med"/>
+                    </a:lnL>
+                    <a:lnR w="12700" cap="flat" cmpd="sng" algn="ctr">
+                      <a:solidFill>
+                        <a:schemeClr val="tx1"/>
+                      </a:solidFill>
+                      <a:prstDash val="solid"/>
+                      <a:round/>
+                      <a:headEnd type="none" w="med" len="med"/>
+                      <a:tailEnd type="none" w="med" len="med"/>
+                    </a:lnR>
+                    <a:lnT w="12700" cap="flat" cmpd="sng" algn="ctr">
+                      <a:solidFill>
+                        <a:schemeClr val="tx1"/>
+                      </a:solidFill>
+                      <a:prstDash val="solid"/>
+                      <a:round/>
+                      <a:headEnd type="none" w="med" len="med"/>
+                      <a:tailEnd type="none" w="med" len="med"/>
+                    </a:lnT>
+                    <a:lnB w="12700" cap="flat" cmpd="sng" algn="ctr">
+                      <a:solidFill>
+                        <a:schemeClr val="tx1"/>
+                      </a:solidFill>
+                      <a:prstDash val="solid"/>
+                      <a:round/>
+                      <a:headEnd type="none" w="med" len="med"/>
+                      <a:tailEnd type="none" w="med" len="med"/>
+                    </a:lnB>
+                    <a:solidFill>
+                      <a:srgbClr val="808001"/>
+                    </a:solidFill>
+                  </a:tcPr>
+                </a:tc>
+                <a:tc>
+                  <a:txBody>
+                    <a:bodyPr/>
+                    <a:lstStyle/>
+                    <a:p>
+                      <a:pPr algn="ctr"/>
+                      <a:endParaRPr lang="en-DE" sz="1600" dirty="0">
+                        <a:latin typeface="Courier New" panose="02070309020205020404" pitchFamily="49" charset="0"/>
+                        <a:cs typeface="Courier New" panose="02070309020205020404" pitchFamily="49" charset="0"/>
+                      </a:endParaRPr>
+                    </a:p>
+                  </a:txBody>
+                  <a:tcPr marL="101079" marR="101079" marT="50539" marB="50539" anchor="ctr">
+                    <a:lnL w="12700" cap="flat" cmpd="sng" algn="ctr">
+                      <a:solidFill>
+                        <a:schemeClr val="tx1"/>
+                      </a:solidFill>
+                      <a:prstDash val="solid"/>
+                      <a:round/>
+                      <a:headEnd type="none" w="med" len="med"/>
+                      <a:tailEnd type="none" w="med" len="med"/>
+                    </a:lnL>
+                    <a:lnR w="12700" cmpd="sng">
+                      <a:solidFill>
+                        <a:schemeClr val="tx1"/>
+                      </a:solidFill>
+                      <a:prstDash val="solid"/>
+                    </a:lnR>
+                    <a:lnT w="12700" cap="flat" cmpd="sng" algn="ctr">
+                      <a:solidFill>
+                        <a:schemeClr val="tx1"/>
+                      </a:solidFill>
+                      <a:prstDash val="solid"/>
+                      <a:round/>
+                      <a:headEnd type="none" w="med" len="med"/>
+                      <a:tailEnd type="none" w="med" len="med"/>
+                    </a:lnT>
+                    <a:lnB w="12700" cap="flat" cmpd="sng" algn="ctr">
+                      <a:solidFill>
+                        <a:schemeClr val="tx1"/>
+                      </a:solidFill>
+                      <a:prstDash val="solid"/>
+                      <a:round/>
+                      <a:headEnd type="none" w="med" len="med"/>
+                      <a:tailEnd type="none" w="med" len="med"/>
+                    </a:lnB>
+                    <a:solidFill>
+                      <a:srgbClr val="808001"/>
+                    </a:solidFill>
+                  </a:tcPr>
+                </a:tc>
+                <a:extLst>
+                  <a:ext uri="{0D108BD9-81ED-4DB2-BD59-A6C34878D82A}">
+                    <a16:rowId xmlns:a16="http://schemas.microsoft.com/office/drawing/2014/main" val="633272598"/>
+                  </a:ext>
+                </a:extLst>
+              </a:tr>
+              <a:tr h="344917">
+                <a:tc>
+                  <a:txBody>
+                    <a:bodyPr/>
+                    <a:lstStyle/>
+                    <a:p>
+                      <a:pPr algn="ctr"/>
+                      <a:endParaRPr lang="en-DE" sz="1600" dirty="0">
+                        <a:latin typeface="Courier New" panose="02070309020205020404" pitchFamily="49" charset="0"/>
+                        <a:cs typeface="Courier New" panose="02070309020205020404" pitchFamily="49" charset="0"/>
+                      </a:endParaRPr>
+                    </a:p>
+                  </a:txBody>
+                  <a:tcPr marL="101079" marR="101079" marT="50539" marB="50539" anchor="ctr">
+                    <a:lnL w="12700" cmpd="sng">
+                      <a:solidFill>
+                        <a:schemeClr val="tx1"/>
+                      </a:solidFill>
+                      <a:prstDash val="solid"/>
+                    </a:lnL>
+                    <a:lnR w="12700" cap="flat" cmpd="sng" algn="ctr">
+                      <a:solidFill>
+                        <a:schemeClr val="tx1"/>
+                      </a:solidFill>
+                      <a:prstDash val="solid"/>
+                      <a:round/>
+                      <a:headEnd type="none" w="med" len="med"/>
+                      <a:tailEnd type="none" w="med" len="med"/>
+                    </a:lnR>
+                    <a:lnT w="12700" cap="flat" cmpd="sng" algn="ctr">
+                      <a:solidFill>
+                        <a:schemeClr val="tx1"/>
+                      </a:solidFill>
+                      <a:prstDash val="solid"/>
+                      <a:round/>
+                      <a:headEnd type="none" w="med" len="med"/>
+                      <a:tailEnd type="none" w="med" len="med"/>
+                    </a:lnT>
+                    <a:lnB w="12700" cap="flat" cmpd="sng" algn="ctr">
+                      <a:solidFill>
+                        <a:schemeClr val="tx1"/>
+                      </a:solidFill>
+                      <a:prstDash val="solid"/>
+                      <a:round/>
+                      <a:headEnd type="none" w="med" len="med"/>
+                      <a:tailEnd type="none" w="med" len="med"/>
+                    </a:lnB>
+                    <a:solidFill>
+                      <a:srgbClr val="FF0001"/>
+                    </a:solidFill>
+                  </a:tcPr>
+                </a:tc>
+                <a:tc>
+                  <a:txBody>
+                    <a:bodyPr/>
+                    <a:lstStyle/>
+                    <a:p>
+                      <a:pPr algn="ctr"/>
+                      <a:endParaRPr lang="en-DE" sz="1600" dirty="0">
+                        <a:latin typeface="Courier New" panose="02070309020205020404" pitchFamily="49" charset="0"/>
+                        <a:cs typeface="Courier New" panose="02070309020205020404" pitchFamily="49" charset="0"/>
+                      </a:endParaRPr>
+                    </a:p>
+                  </a:txBody>
+                  <a:tcPr marL="101079" marR="101079" marT="50539" marB="50539" anchor="ctr">
+                    <a:lnL w="12700" cap="flat" cmpd="sng" algn="ctr">
+                      <a:solidFill>
+                        <a:schemeClr val="tx1"/>
+                      </a:solidFill>
+                      <a:prstDash val="solid"/>
+                      <a:round/>
+                      <a:headEnd type="none" w="med" len="med"/>
+                      <a:tailEnd type="none" w="med" len="med"/>
+                    </a:lnL>
+                    <a:lnR w="12700" cap="flat" cmpd="sng" algn="ctr">
+                      <a:solidFill>
+                        <a:schemeClr val="tx1"/>
+                      </a:solidFill>
+                      <a:prstDash val="solid"/>
+                      <a:round/>
+                      <a:headEnd type="none" w="med" len="med"/>
+                      <a:tailEnd type="none" w="med" len="med"/>
+                    </a:lnR>
+                    <a:lnT w="12700" cap="flat" cmpd="sng" algn="ctr">
+                      <a:solidFill>
+                        <a:schemeClr val="tx1"/>
+                      </a:solidFill>
+                      <a:prstDash val="solid"/>
+                      <a:round/>
+                      <a:headEnd type="none" w="med" len="med"/>
+                      <a:tailEnd type="none" w="med" len="med"/>
+                    </a:lnT>
+                    <a:lnB w="12700" cap="flat" cmpd="sng" algn="ctr">
+                      <a:solidFill>
+                        <a:schemeClr val="tx1"/>
+                      </a:solidFill>
+                      <a:prstDash val="solid"/>
+                      <a:round/>
+                      <a:headEnd type="none" w="med" len="med"/>
+                      <a:tailEnd type="none" w="med" len="med"/>
+                    </a:lnB>
+                    <a:solidFill>
+                      <a:srgbClr val="FF0001"/>
+                    </a:solidFill>
+                  </a:tcPr>
+                </a:tc>
+                <a:tc>
+                  <a:txBody>
+                    <a:bodyPr/>
+                    <a:lstStyle/>
+                    <a:p>
+                      <a:pPr algn="ctr"/>
+                      <a:endParaRPr lang="en-DE" sz="1600" dirty="0">
+                        <a:latin typeface="Courier New" panose="02070309020205020404" pitchFamily="49" charset="0"/>
+                        <a:cs typeface="Courier New" panose="02070309020205020404" pitchFamily="49" charset="0"/>
+                      </a:endParaRPr>
+                    </a:p>
+                  </a:txBody>
+                  <a:tcPr marL="101079" marR="101079" marT="50539" marB="50539" anchor="ctr">
+                    <a:lnL w="12700" cap="flat" cmpd="sng" algn="ctr">
+                      <a:solidFill>
+                        <a:schemeClr val="tx1"/>
+                      </a:solidFill>
+                      <a:prstDash val="solid"/>
+                      <a:round/>
+                      <a:headEnd type="none" w="med" len="med"/>
+                      <a:tailEnd type="none" w="med" len="med"/>
+                    </a:lnL>
+                    <a:lnR w="12700" cap="flat" cmpd="sng" algn="ctr">
+                      <a:solidFill>
+                        <a:schemeClr val="tx1"/>
+                      </a:solidFill>
+                      <a:prstDash val="solid"/>
+                      <a:round/>
+                      <a:headEnd type="none" w="med" len="med"/>
+                      <a:tailEnd type="none" w="med" len="med"/>
+                    </a:lnR>
+                    <a:lnT w="12700" cap="flat" cmpd="sng" algn="ctr">
+                      <a:solidFill>
+                        <a:schemeClr val="tx1"/>
+                      </a:solidFill>
+                      <a:prstDash val="solid"/>
+                      <a:round/>
+                      <a:headEnd type="none" w="med" len="med"/>
+                      <a:tailEnd type="none" w="med" len="med"/>
+                    </a:lnT>
+                    <a:lnB w="12700" cap="flat" cmpd="sng" algn="ctr">
+                      <a:solidFill>
+                        <a:schemeClr val="tx1"/>
+                      </a:solidFill>
+                      <a:prstDash val="solid"/>
+                      <a:round/>
+                      <a:headEnd type="none" w="med" len="med"/>
+                      <a:tailEnd type="none" w="med" len="med"/>
+                    </a:lnB>
+                    <a:solidFill>
+                      <a:srgbClr val="FF0001"/>
+                    </a:solidFill>
+                  </a:tcPr>
+                </a:tc>
+                <a:tc>
+                  <a:txBody>
+                    <a:bodyPr/>
+                    <a:lstStyle/>
+                    <a:p>
+                      <a:pPr algn="ctr"/>
+                      <a:endParaRPr lang="en-DE" sz="1600" dirty="0">
+                        <a:latin typeface="Courier New" panose="02070309020205020404" pitchFamily="49" charset="0"/>
+                        <a:cs typeface="Courier New" panose="02070309020205020404" pitchFamily="49" charset="0"/>
+                      </a:endParaRPr>
+                    </a:p>
+                  </a:txBody>
+                  <a:tcPr marL="101079" marR="101079" marT="50539" marB="50539" anchor="ctr">
+                    <a:lnL w="12700" cap="flat" cmpd="sng" algn="ctr">
+                      <a:solidFill>
+                        <a:schemeClr val="tx1"/>
+                      </a:solidFill>
+                      <a:prstDash val="solid"/>
+                      <a:round/>
+                      <a:headEnd type="none" w="med" len="med"/>
+                      <a:tailEnd type="none" w="med" len="med"/>
+                    </a:lnL>
+                    <a:lnR w="12700" cap="flat" cmpd="sng" algn="ctr">
+                      <a:solidFill>
+                        <a:schemeClr val="tx1"/>
+                      </a:solidFill>
+                      <a:prstDash val="solid"/>
+                      <a:round/>
+                      <a:headEnd type="none" w="med" len="med"/>
+                      <a:tailEnd type="none" w="med" len="med"/>
+                    </a:lnR>
+                    <a:lnT w="12700" cap="flat" cmpd="sng" algn="ctr">
+                      <a:solidFill>
+                        <a:schemeClr val="tx1"/>
+                      </a:solidFill>
+                      <a:prstDash val="solid"/>
+                      <a:round/>
+                      <a:headEnd type="none" w="med" len="med"/>
+                      <a:tailEnd type="none" w="med" len="med"/>
+                    </a:lnT>
+                    <a:lnB w="12700" cap="flat" cmpd="sng" algn="ctr">
+                      <a:solidFill>
+                        <a:schemeClr val="tx1"/>
+                      </a:solidFill>
+                      <a:prstDash val="solid"/>
+                      <a:round/>
+                      <a:headEnd type="none" w="med" len="med"/>
+                      <a:tailEnd type="none" w="med" len="med"/>
+                    </a:lnB>
+                    <a:solidFill>
+                      <a:srgbClr val="808001"/>
+                    </a:solidFill>
+                  </a:tcPr>
+                </a:tc>
+                <a:tc>
+                  <a:txBody>
+                    <a:bodyPr/>
+                    <a:lstStyle/>
+                    <a:p>
+                      <a:pPr algn="ctr"/>
+                      <a:endParaRPr lang="en-DE" sz="1600" dirty="0">
+                        <a:latin typeface="Courier New" panose="02070309020205020404" pitchFamily="49" charset="0"/>
+                        <a:cs typeface="Courier New" panose="02070309020205020404" pitchFamily="49" charset="0"/>
+                      </a:endParaRPr>
+                    </a:p>
+                  </a:txBody>
+                  <a:tcPr marL="101079" marR="101079" marT="50539" marB="50539" anchor="ctr">
+                    <a:lnL w="12700" cap="flat" cmpd="sng" algn="ctr">
+                      <a:solidFill>
+                        <a:schemeClr val="tx1"/>
+                      </a:solidFill>
+                      <a:prstDash val="solid"/>
+                      <a:round/>
+                      <a:headEnd type="none" w="med" len="med"/>
+                      <a:tailEnd type="none" w="med" len="med"/>
+                    </a:lnL>
+                    <a:lnR w="12700" cap="flat" cmpd="sng" algn="ctr">
+                      <a:solidFill>
+                        <a:schemeClr val="tx1"/>
+                      </a:solidFill>
+                      <a:prstDash val="solid"/>
+                      <a:round/>
+                      <a:headEnd type="none" w="med" len="med"/>
+                      <a:tailEnd type="none" w="med" len="med"/>
+                    </a:lnR>
+                    <a:lnT w="12700" cap="flat" cmpd="sng" algn="ctr">
+                      <a:solidFill>
+                        <a:schemeClr val="tx1"/>
+                      </a:solidFill>
+                      <a:prstDash val="solid"/>
+                      <a:round/>
+                      <a:headEnd type="none" w="med" len="med"/>
+                      <a:tailEnd type="none" w="med" len="med"/>
+                    </a:lnT>
+                    <a:lnB w="12700" cap="flat" cmpd="sng" algn="ctr">
+                      <a:solidFill>
+                        <a:schemeClr val="tx1"/>
+                      </a:solidFill>
+                      <a:prstDash val="solid"/>
+                      <a:round/>
+                      <a:headEnd type="none" w="med" len="med"/>
+                      <a:tailEnd type="none" w="med" len="med"/>
+                    </a:lnB>
+                    <a:solidFill>
+                      <a:srgbClr val="808001"/>
+                    </a:solidFill>
+                  </a:tcPr>
+                </a:tc>
+                <a:tc>
+                  <a:txBody>
+                    <a:bodyPr/>
+                    <a:lstStyle/>
+                    <a:p>
+                      <a:pPr algn="ctr"/>
+                      <a:endParaRPr lang="en-DE" sz="1600" dirty="0">
+                        <a:latin typeface="Courier New" panose="02070309020205020404" pitchFamily="49" charset="0"/>
+                        <a:cs typeface="Courier New" panose="02070309020205020404" pitchFamily="49" charset="0"/>
+                      </a:endParaRPr>
+                    </a:p>
+                  </a:txBody>
+                  <a:tcPr marL="101079" marR="101079" marT="50539" marB="50539" anchor="ctr">
+                    <a:lnL w="12700" cap="flat" cmpd="sng" algn="ctr">
+                      <a:solidFill>
+                        <a:schemeClr val="tx1"/>
+                      </a:solidFill>
+                      <a:prstDash val="solid"/>
+                      <a:round/>
+                      <a:headEnd type="none" w="med" len="med"/>
+                      <a:tailEnd type="none" w="med" len="med"/>
+                    </a:lnL>
+                    <a:lnR w="12700" cmpd="sng">
+                      <a:solidFill>
+                        <a:schemeClr val="tx1"/>
+                      </a:solidFill>
+                      <a:prstDash val="solid"/>
+                    </a:lnR>
+                    <a:lnT w="12700" cap="flat" cmpd="sng" algn="ctr">
+                      <a:solidFill>
+                        <a:schemeClr val="tx1"/>
+                      </a:solidFill>
+                      <a:prstDash val="solid"/>
+                      <a:round/>
+                      <a:headEnd type="none" w="med" len="med"/>
+                      <a:tailEnd type="none" w="med" len="med"/>
+                    </a:lnT>
+                    <a:lnB w="12700" cap="flat" cmpd="sng" algn="ctr">
+                      <a:solidFill>
+                        <a:schemeClr val="tx1"/>
+                      </a:solidFill>
+                      <a:prstDash val="solid"/>
+                      <a:round/>
+                      <a:headEnd type="none" w="med" len="med"/>
+                      <a:tailEnd type="none" w="med" len="med"/>
+                    </a:lnB>
+                    <a:solidFill>
+                      <a:srgbClr val="808001"/>
+                    </a:solidFill>
+                  </a:tcPr>
+                </a:tc>
+                <a:extLst>
+                  <a:ext uri="{0D108BD9-81ED-4DB2-BD59-A6C34878D82A}">
+                    <a16:rowId xmlns:a16="http://schemas.microsoft.com/office/drawing/2014/main" val="2092330748"/>
+                  </a:ext>
+                </a:extLst>
+              </a:tr>
+              <a:tr h="344917">
+                <a:tc>
+                  <a:txBody>
+                    <a:bodyPr/>
+                    <a:lstStyle/>
+                    <a:p>
+                      <a:pPr algn="ctr"/>
+                      <a:endParaRPr lang="en-DE" sz="1600" dirty="0">
+                        <a:latin typeface="Courier New" panose="02070309020205020404" pitchFamily="49" charset="0"/>
+                        <a:cs typeface="Courier New" panose="02070309020205020404" pitchFamily="49" charset="0"/>
+                      </a:endParaRPr>
+                    </a:p>
+                  </a:txBody>
+                  <a:tcPr marL="101079" marR="101079" marT="50539" marB="50539" anchor="ctr">
+                    <a:lnL w="12700" cmpd="sng">
+                      <a:solidFill>
+                        <a:schemeClr val="tx1"/>
+                      </a:solidFill>
+                      <a:prstDash val="solid"/>
+                    </a:lnL>
+                    <a:lnR w="12700" cap="flat" cmpd="sng" algn="ctr">
+                      <a:solidFill>
+                        <a:schemeClr val="tx1"/>
+                      </a:solidFill>
+                      <a:prstDash val="solid"/>
+                      <a:round/>
+                      <a:headEnd type="none" w="med" len="med"/>
+                      <a:tailEnd type="none" w="med" len="med"/>
+                    </a:lnR>
+                    <a:lnT w="12700" cap="flat" cmpd="sng" algn="ctr">
+                      <a:solidFill>
+                        <a:schemeClr val="tx1"/>
+                      </a:solidFill>
+                      <a:prstDash val="solid"/>
+                      <a:round/>
+                      <a:headEnd type="none" w="med" len="med"/>
+                      <a:tailEnd type="none" w="med" len="med"/>
+                    </a:lnT>
+                    <a:lnB w="12700" cmpd="sng">
+                      <a:solidFill>
+                        <a:schemeClr val="tx1"/>
+                      </a:solidFill>
+                      <a:prstDash val="solid"/>
+                    </a:lnB>
+                    <a:solidFill>
+                      <a:srgbClr val="FF0001"/>
+                    </a:solidFill>
+                  </a:tcPr>
+                </a:tc>
+                <a:tc>
+                  <a:txBody>
+                    <a:bodyPr/>
+                    <a:lstStyle/>
+                    <a:p>
+                      <a:pPr algn="ctr"/>
+                      <a:endParaRPr lang="en-DE" sz="1600" dirty="0">
+                        <a:latin typeface="Courier New" panose="02070309020205020404" pitchFamily="49" charset="0"/>
+                        <a:cs typeface="Courier New" panose="02070309020205020404" pitchFamily="49" charset="0"/>
+                      </a:endParaRPr>
+                    </a:p>
+                  </a:txBody>
+                  <a:tcPr marL="101079" marR="101079" marT="50539" marB="50539" anchor="ctr">
+                    <a:lnL w="12700" cap="flat" cmpd="sng" algn="ctr">
+                      <a:solidFill>
+                        <a:schemeClr val="tx1"/>
+                      </a:solidFill>
+                      <a:prstDash val="solid"/>
+                      <a:round/>
+                      <a:headEnd type="none" w="med" len="med"/>
+                      <a:tailEnd type="none" w="med" len="med"/>
+                    </a:lnL>
+                    <a:lnR w="12700" cap="flat" cmpd="sng" algn="ctr">
+                      <a:solidFill>
+                        <a:schemeClr val="tx1"/>
+                      </a:solidFill>
+                      <a:prstDash val="solid"/>
+                      <a:round/>
+                      <a:headEnd type="none" w="med" len="med"/>
+                      <a:tailEnd type="none" w="med" len="med"/>
+                    </a:lnR>
+                    <a:lnT w="12700" cap="flat" cmpd="sng" algn="ctr">
+                      <a:solidFill>
+                        <a:schemeClr val="tx1"/>
+                      </a:solidFill>
+                      <a:prstDash val="solid"/>
+                      <a:round/>
+                      <a:headEnd type="none" w="med" len="med"/>
+                      <a:tailEnd type="none" w="med" len="med"/>
+                    </a:lnT>
+                    <a:lnB w="12700" cmpd="sng">
+                      <a:solidFill>
+                        <a:schemeClr val="tx1"/>
+                      </a:solidFill>
+                      <a:prstDash val="solid"/>
+                    </a:lnB>
+                    <a:solidFill>
+                      <a:srgbClr val="FF0001"/>
+                    </a:solidFill>
+                  </a:tcPr>
+                </a:tc>
+                <a:tc>
+                  <a:txBody>
+                    <a:bodyPr/>
+                    <a:lstStyle/>
+                    <a:p>
+                      <a:pPr algn="ctr"/>
+                      <a:endParaRPr lang="en-DE" sz="1600" dirty="0">
+                        <a:latin typeface="Courier New" panose="02070309020205020404" pitchFamily="49" charset="0"/>
+                        <a:cs typeface="Courier New" panose="02070309020205020404" pitchFamily="49" charset="0"/>
+                      </a:endParaRPr>
+                    </a:p>
+                  </a:txBody>
+                  <a:tcPr marL="101079" marR="101079" marT="50539" marB="50539" anchor="ctr">
+                    <a:lnL w="12700" cap="flat" cmpd="sng" algn="ctr">
+                      <a:solidFill>
+                        <a:schemeClr val="tx1"/>
+                      </a:solidFill>
+                      <a:prstDash val="solid"/>
+                      <a:round/>
+                      <a:headEnd type="none" w="med" len="med"/>
+                      <a:tailEnd type="none" w="med" len="med"/>
+                    </a:lnL>
+                    <a:lnR w="12700" cap="flat" cmpd="sng" algn="ctr">
+                      <a:solidFill>
+                        <a:schemeClr val="tx1"/>
+                      </a:solidFill>
+                      <a:prstDash val="solid"/>
+                      <a:round/>
+                      <a:headEnd type="none" w="med" len="med"/>
+                      <a:tailEnd type="none" w="med" len="med"/>
+                    </a:lnR>
+                    <a:lnT w="12700" cap="flat" cmpd="sng" algn="ctr">
+                      <a:solidFill>
+                        <a:schemeClr val="tx1"/>
+                      </a:solidFill>
+                      <a:prstDash val="solid"/>
+                      <a:round/>
+                      <a:headEnd type="none" w="med" len="med"/>
+                      <a:tailEnd type="none" w="med" len="med"/>
+                    </a:lnT>
+                    <a:lnB w="12700" cmpd="sng">
+                      <a:solidFill>
+                        <a:schemeClr val="tx1"/>
+                      </a:solidFill>
+                      <a:prstDash val="solid"/>
+                    </a:lnB>
+                    <a:solidFill>
+                      <a:srgbClr val="FF0001"/>
+                    </a:solidFill>
+                  </a:tcPr>
+                </a:tc>
+                <a:tc>
+                  <a:txBody>
+                    <a:bodyPr/>
+                    <a:lstStyle/>
+                    <a:p>
+                      <a:pPr algn="ctr"/>
+                      <a:endParaRPr lang="en-DE" sz="1600" dirty="0">
+                        <a:latin typeface="Courier New" panose="02070309020205020404" pitchFamily="49" charset="0"/>
+                        <a:cs typeface="Courier New" panose="02070309020205020404" pitchFamily="49" charset="0"/>
+                      </a:endParaRPr>
+                    </a:p>
+                  </a:txBody>
+                  <a:tcPr marL="101079" marR="101079" marT="50539" marB="50539" anchor="ctr">
+                    <a:lnL w="12700" cap="flat" cmpd="sng" algn="ctr">
+                      <a:solidFill>
+                        <a:schemeClr val="tx1"/>
+                      </a:solidFill>
+                      <a:prstDash val="solid"/>
+                      <a:round/>
+                      <a:headEnd type="none" w="med" len="med"/>
+                      <a:tailEnd type="none" w="med" len="med"/>
+                    </a:lnL>
+                    <a:lnR w="12700" cap="flat" cmpd="sng" algn="ctr">
+                      <a:solidFill>
+                        <a:schemeClr val="tx1"/>
+                      </a:solidFill>
+                      <a:prstDash val="solid"/>
+                      <a:round/>
+                      <a:headEnd type="none" w="med" len="med"/>
+                      <a:tailEnd type="none" w="med" len="med"/>
+                    </a:lnR>
+                    <a:lnT w="12700" cap="flat" cmpd="sng" algn="ctr">
+                      <a:solidFill>
+                        <a:schemeClr val="tx1"/>
+                      </a:solidFill>
+                      <a:prstDash val="solid"/>
+                      <a:round/>
+                      <a:headEnd type="none" w="med" len="med"/>
+                      <a:tailEnd type="none" w="med" len="med"/>
+                    </a:lnT>
+                    <a:lnB w="12700" cmpd="sng">
+                      <a:solidFill>
+                        <a:schemeClr val="tx1"/>
+                      </a:solidFill>
+                      <a:prstDash val="solid"/>
+                    </a:lnB>
+                    <a:solidFill>
+                      <a:srgbClr val="808001"/>
+                    </a:solidFill>
+                  </a:tcPr>
+                </a:tc>
+                <a:tc>
+                  <a:txBody>
+                    <a:bodyPr/>
+                    <a:lstStyle/>
+                    <a:p>
+                      <a:pPr algn="ctr"/>
+                      <a:endParaRPr lang="en-DE" sz="1600" dirty="0">
+                        <a:latin typeface="Courier New" panose="02070309020205020404" pitchFamily="49" charset="0"/>
+                        <a:cs typeface="Courier New" panose="02070309020205020404" pitchFamily="49" charset="0"/>
+                      </a:endParaRPr>
+                    </a:p>
+                  </a:txBody>
+                  <a:tcPr marL="101079" marR="101079" marT="50539" marB="50539" anchor="ctr">
+                    <a:lnL w="12700" cap="flat" cmpd="sng" algn="ctr">
+                      <a:solidFill>
+                        <a:schemeClr val="tx1"/>
+                      </a:solidFill>
+                      <a:prstDash val="solid"/>
+                      <a:round/>
+                      <a:headEnd type="none" w="med" len="med"/>
+                      <a:tailEnd type="none" w="med" len="med"/>
+                    </a:lnL>
+                    <a:lnR w="12700" cap="flat" cmpd="sng" algn="ctr">
+                      <a:solidFill>
+                        <a:schemeClr val="tx1"/>
+                      </a:solidFill>
+                      <a:prstDash val="solid"/>
+                      <a:round/>
+                      <a:headEnd type="none" w="med" len="med"/>
+                      <a:tailEnd type="none" w="med" len="med"/>
+                    </a:lnR>
+                    <a:lnT w="12700" cap="flat" cmpd="sng" algn="ctr">
+                      <a:solidFill>
+                        <a:schemeClr val="tx1"/>
+                      </a:solidFill>
+                      <a:prstDash val="solid"/>
+                      <a:round/>
+                      <a:headEnd type="none" w="med" len="med"/>
+                      <a:tailEnd type="none" w="med" len="med"/>
+                    </a:lnT>
+                    <a:lnB w="12700" cmpd="sng">
+                      <a:solidFill>
+                        <a:schemeClr val="tx1"/>
+                      </a:solidFill>
+                      <a:prstDash val="solid"/>
+                    </a:lnB>
+                    <a:solidFill>
+                      <a:srgbClr val="808001"/>
+                    </a:solidFill>
+                  </a:tcPr>
+                </a:tc>
+                <a:tc>
+                  <a:txBody>
+                    <a:bodyPr/>
+                    <a:lstStyle/>
+                    <a:p>
+                      <a:pPr algn="ctr"/>
+                      <a:endParaRPr lang="en-DE" sz="1600" dirty="0">
+                        <a:latin typeface="Courier New" panose="02070309020205020404" pitchFamily="49" charset="0"/>
+                        <a:cs typeface="Courier New" panose="02070309020205020404" pitchFamily="49" charset="0"/>
+                      </a:endParaRPr>
+                    </a:p>
+                  </a:txBody>
+                  <a:tcPr marL="101079" marR="101079" marT="50539" marB="50539" anchor="ctr">
+                    <a:lnL w="12700" cap="flat" cmpd="sng" algn="ctr">
+                      <a:solidFill>
+                        <a:schemeClr val="tx1"/>
+                      </a:solidFill>
+                      <a:prstDash val="solid"/>
+                      <a:round/>
+                      <a:headEnd type="none" w="med" len="med"/>
+                      <a:tailEnd type="none" w="med" len="med"/>
+                    </a:lnL>
+                    <a:lnR w="12700" cmpd="sng">
+                      <a:solidFill>
+                        <a:schemeClr val="tx1"/>
+                      </a:solidFill>
+                      <a:prstDash val="solid"/>
+                    </a:lnR>
+                    <a:lnT w="12700" cap="flat" cmpd="sng" algn="ctr">
+                      <a:solidFill>
+                        <a:schemeClr val="tx1"/>
+                      </a:solidFill>
+                      <a:prstDash val="solid"/>
+                      <a:round/>
+                      <a:headEnd type="none" w="med" len="med"/>
+                      <a:tailEnd type="none" w="med" len="med"/>
+                    </a:lnT>
+                    <a:lnB w="12700" cmpd="sng">
+                      <a:solidFill>
+                        <a:schemeClr val="tx1"/>
+                      </a:solidFill>
+                      <a:prstDash val="solid"/>
+                    </a:lnB>
+                    <a:solidFill>
+                      <a:srgbClr val="808001"/>
+                    </a:solidFill>
+                  </a:tcPr>
+                </a:tc>
+                <a:extLst>
+                  <a:ext uri="{0D108BD9-81ED-4DB2-BD59-A6C34878D82A}">
+                    <a16:rowId xmlns:a16="http://schemas.microsoft.com/office/drawing/2014/main" val="106338012"/>
+                  </a:ext>
+                </a:extLst>
+              </a:tr>
+            </a:tbl>
+          </a:graphicData>
+        </a:graphic>
+      </p:graphicFrame>
+      <p:sp>
+        <p:nvSpPr>
+          <p:cNvPr id="7" name="TextBox 6">
+            <a:extLst>
+              <a:ext uri="{FF2B5EF4-FFF2-40B4-BE49-F238E27FC236}">
+                <a16:creationId xmlns:a16="http://schemas.microsoft.com/office/drawing/2014/main" id="{41299504-107E-13F5-5A28-CD9E51AA6F9A}"/>
+              </a:ext>
+            </a:extLst>
+          </p:cNvPr>
+          <p:cNvSpPr txBox="1"/>
+          <p:nvPr/>
+        </p:nvSpPr>
+        <p:spPr>
+          <a:xfrm>
+            <a:off x="6900660" y="4366753"/>
+            <a:ext cx="722444" cy="1938992"/>
+          </a:xfrm>
+          <a:prstGeom prst="rect">
+            <a:avLst/>
+          </a:prstGeom>
+          <a:noFill/>
+        </p:spPr>
+        <p:txBody>
+          <a:bodyPr wrap="square" rtlCol="0">
+            <a:spAutoFit/>
+          </a:bodyPr>
+          <a:lstStyle/>
+          <a:p>
+            <a:r>
+              <a:rPr lang="en-US" sz="2000" dirty="0">
+                <a:latin typeface="Courier New" panose="02070309020205020404" pitchFamily="49" charset="0"/>
+                <a:cs typeface="Courier New" panose="02070309020205020404" pitchFamily="49" charset="0"/>
+              </a:rPr>
+              <a:t>0/</a:t>
+            </a:r>
+            <a:r>
+              <a:rPr lang="en-US" sz="2000" dirty="0">
+                <a:highlight>
+                  <a:srgbClr val="FFFF00"/>
+                </a:highlight>
+                <a:latin typeface="Courier New" panose="02070309020205020404" pitchFamily="49" charset="0"/>
+                <a:cs typeface="Courier New" panose="02070309020205020404" pitchFamily="49" charset="0"/>
+              </a:rPr>
+              <a:t>0</a:t>
+            </a:r>
+            <a:br>
+              <a:rPr lang="en-US" sz="2000" dirty="0">
+                <a:latin typeface="Courier New" panose="02070309020205020404" pitchFamily="49" charset="0"/>
+                <a:cs typeface="Courier New" panose="02070309020205020404" pitchFamily="49" charset="0"/>
+              </a:rPr>
+            </a:br>
+            <a:r>
+              <a:rPr lang="en-US" sz="2000" dirty="0">
+                <a:latin typeface="Courier New" panose="02070309020205020404" pitchFamily="49" charset="0"/>
+                <a:cs typeface="Courier New" panose="02070309020205020404" pitchFamily="49" charset="0"/>
+              </a:rPr>
+              <a:t>0/</a:t>
+            </a:r>
+            <a:r>
+              <a:rPr lang="en-US" sz="2000" dirty="0">
+                <a:highlight>
+                  <a:srgbClr val="FF00FF"/>
+                </a:highlight>
+                <a:latin typeface="Courier New" panose="02070309020205020404" pitchFamily="49" charset="0"/>
+                <a:cs typeface="Courier New" panose="02070309020205020404" pitchFamily="49" charset="0"/>
+              </a:rPr>
+              <a:t>1</a:t>
+            </a:r>
+            <a:endParaRPr lang="en-DE" sz="2000" dirty="0">
+              <a:highlight>
+                <a:srgbClr val="FF00FF"/>
+              </a:highlight>
+              <a:latin typeface="Courier New" panose="02070309020205020404" pitchFamily="49" charset="0"/>
+              <a:cs typeface="Courier New" panose="02070309020205020404" pitchFamily="49" charset="0"/>
+            </a:endParaRPr>
+          </a:p>
+          <a:p>
+            <a:r>
+              <a:rPr lang="en-US" sz="2000" dirty="0">
+                <a:latin typeface="Courier New" panose="02070309020205020404" pitchFamily="49" charset="0"/>
+                <a:cs typeface="Courier New" panose="02070309020205020404" pitchFamily="49" charset="0"/>
+              </a:rPr>
+              <a:t>0/</a:t>
+            </a:r>
+            <a:r>
+              <a:rPr lang="en-US" sz="2000" dirty="0">
+                <a:highlight>
+                  <a:srgbClr val="FF0000"/>
+                </a:highlight>
+                <a:latin typeface="Courier New" panose="02070309020205020404" pitchFamily="49" charset="0"/>
+                <a:cs typeface="Courier New" panose="02070309020205020404" pitchFamily="49" charset="0"/>
+              </a:rPr>
+              <a:t>2</a:t>
+            </a:r>
+            <a:endParaRPr lang="en-DE" sz="2000" dirty="0">
+              <a:highlight>
+                <a:srgbClr val="FF0000"/>
+              </a:highlight>
+              <a:latin typeface="Courier New" panose="02070309020205020404" pitchFamily="49" charset="0"/>
+              <a:cs typeface="Courier New" panose="02070309020205020404" pitchFamily="49" charset="0"/>
+            </a:endParaRPr>
+          </a:p>
+          <a:p>
+            <a:r>
+              <a:rPr lang="en-US" sz="2000" dirty="0">
+                <a:latin typeface="Courier New" panose="02070309020205020404" pitchFamily="49" charset="0"/>
+                <a:cs typeface="Courier New" panose="02070309020205020404" pitchFamily="49" charset="0"/>
+              </a:rPr>
+              <a:t>0/</a:t>
+            </a:r>
+            <a:r>
+              <a:rPr lang="en-US" sz="2000" dirty="0">
+                <a:highlight>
+                  <a:srgbClr val="808000"/>
+                </a:highlight>
+                <a:latin typeface="Courier New" panose="02070309020205020404" pitchFamily="49" charset="0"/>
+                <a:cs typeface="Courier New" panose="02070309020205020404" pitchFamily="49" charset="0"/>
+              </a:rPr>
+              <a:t>#</a:t>
+            </a:r>
+            <a:br>
+              <a:rPr lang="en-US" sz="2000" dirty="0">
+                <a:latin typeface="Courier New" panose="02070309020205020404" pitchFamily="49" charset="0"/>
+                <a:cs typeface="Courier New" panose="02070309020205020404" pitchFamily="49" charset="0"/>
+              </a:rPr>
+            </a:br>
+            <a:endParaRPr lang="en-DE" sz="2000" dirty="0">
+              <a:latin typeface="Courier New" panose="02070309020205020404" pitchFamily="49" charset="0"/>
+              <a:cs typeface="Courier New" panose="02070309020205020404" pitchFamily="49" charset="0"/>
+            </a:endParaRPr>
+          </a:p>
+          <a:p>
+            <a:endParaRPr lang="en-DE" sz="2000" dirty="0">
+              <a:latin typeface="Courier New" panose="02070309020205020404" pitchFamily="49" charset="0"/>
+              <a:cs typeface="Courier New" panose="02070309020205020404" pitchFamily="49" charset="0"/>
+            </a:endParaRPr>
+          </a:p>
+        </p:txBody>
+      </p:sp>
+      <p:cxnSp>
+        <p:nvCxnSpPr>
+          <p:cNvPr id="8" name="Straight Arrow Connector 7">
+            <a:extLst>
+              <a:ext uri="{FF2B5EF4-FFF2-40B4-BE49-F238E27FC236}">
+                <a16:creationId xmlns:a16="http://schemas.microsoft.com/office/drawing/2014/main" id="{622164C4-EAD7-5060-0959-105521B16517}"/>
+              </a:ext>
+            </a:extLst>
+          </p:cNvPr>
+          <p:cNvCxnSpPr>
+            <a:cxnSpLocks/>
+          </p:cNvCxnSpPr>
+          <p:nvPr/>
+        </p:nvCxnSpPr>
+        <p:spPr>
+          <a:xfrm>
+            <a:off x="8348643" y="1963152"/>
+            <a:ext cx="931519" cy="0"/>
+          </a:xfrm>
+          <a:prstGeom prst="straightConnector1">
+            <a:avLst/>
+          </a:prstGeom>
+          <a:ln>
+            <a:solidFill>
+              <a:schemeClr val="tx1"/>
+            </a:solidFill>
+            <a:tailEnd type="triangle"/>
+          </a:ln>
+        </p:spPr>
+        <p:style>
+          <a:lnRef idx="1">
+            <a:schemeClr val="accent1"/>
+          </a:lnRef>
+          <a:fillRef idx="0">
+            <a:schemeClr val="accent1"/>
+          </a:fillRef>
+          <a:effectRef idx="0">
+            <a:schemeClr val="accent1"/>
+          </a:effectRef>
+          <a:fontRef idx="minor">
+            <a:schemeClr val="tx1"/>
+          </a:fontRef>
+        </p:style>
+      </p:cxnSp>
+      <p:sp>
+        <p:nvSpPr>
+          <p:cNvPr id="10" name="TextBox 9">
+            <a:extLst>
+              <a:ext uri="{FF2B5EF4-FFF2-40B4-BE49-F238E27FC236}">
+                <a16:creationId xmlns:a16="http://schemas.microsoft.com/office/drawing/2014/main" id="{DF7E9E09-3088-1F60-F0C9-B67D7D6BF9F9}"/>
+              </a:ext>
+            </a:extLst>
+          </p:cNvPr>
+          <p:cNvSpPr txBox="1"/>
+          <p:nvPr/>
+        </p:nvSpPr>
+        <p:spPr>
+          <a:xfrm>
+            <a:off x="1167750" y="3429000"/>
+            <a:ext cx="2480359" cy="369332"/>
+          </a:xfrm>
+          <a:prstGeom prst="rect">
+            <a:avLst/>
+          </a:prstGeom>
+          <a:noFill/>
+        </p:spPr>
+        <p:txBody>
+          <a:bodyPr wrap="none" rtlCol="0">
+            <a:spAutoFit/>
+          </a:bodyPr>
+          <a:lstStyle/>
+          <a:p>
+            <a:r>
+              <a:rPr lang="en-US" dirty="0">
+                <a:latin typeface="Calibri" panose="020F0502020204030204" pitchFamily="34" charset="0"/>
+                <a:cs typeface="Calibri" panose="020F0502020204030204" pitchFamily="34" charset="0"/>
+              </a:rPr>
+              <a:t>Metadata JSON text files</a:t>
+            </a:r>
+            <a:endParaRPr lang="en-DE" dirty="0">
+              <a:latin typeface="Calibri" panose="020F0502020204030204" pitchFamily="34" charset="0"/>
+              <a:cs typeface="Calibri" panose="020F0502020204030204" pitchFamily="34" charset="0"/>
+            </a:endParaRPr>
+          </a:p>
+        </p:txBody>
+      </p:sp>
+      <p:sp>
+        <p:nvSpPr>
+          <p:cNvPr id="11" name="TextBox 10">
+            <a:extLst>
+              <a:ext uri="{FF2B5EF4-FFF2-40B4-BE49-F238E27FC236}">
+                <a16:creationId xmlns:a16="http://schemas.microsoft.com/office/drawing/2014/main" id="{BC957362-92BF-BFF3-0731-404AC44E15E6}"/>
+              </a:ext>
+            </a:extLst>
+          </p:cNvPr>
+          <p:cNvSpPr txBox="1"/>
+          <p:nvPr/>
+        </p:nvSpPr>
+        <p:spPr>
+          <a:xfrm>
+            <a:off x="7933310" y="1454886"/>
+            <a:ext cx="1727524" cy="369332"/>
+          </a:xfrm>
+          <a:prstGeom prst="rect">
+            <a:avLst/>
+          </a:prstGeom>
+          <a:noFill/>
+        </p:spPr>
+        <p:txBody>
+          <a:bodyPr wrap="square">
+            <a:spAutoFit/>
+          </a:bodyPr>
+          <a:lstStyle/>
+          <a:p>
+            <a:pPr algn="ctr"/>
+            <a:r>
+              <a:rPr lang="en-US" dirty="0">
+                <a:latin typeface="Calibri" panose="020F0502020204030204" pitchFamily="34" charset="0"/>
+                <a:cs typeface="Calibri" panose="020F0502020204030204" pitchFamily="34" charset="0"/>
+              </a:rPr>
+              <a:t>Down-scale</a:t>
+            </a:r>
+            <a:endParaRPr lang="en-DE" dirty="0">
+              <a:latin typeface="Calibri" panose="020F0502020204030204" pitchFamily="34" charset="0"/>
+              <a:cs typeface="Calibri" panose="020F0502020204030204" pitchFamily="34" charset="0"/>
+            </a:endParaRPr>
+          </a:p>
+        </p:txBody>
+      </p:sp>
+      <p:graphicFrame>
+        <p:nvGraphicFramePr>
+          <p:cNvPr id="16" name="Table 15">
+            <a:extLst>
+              <a:ext uri="{FF2B5EF4-FFF2-40B4-BE49-F238E27FC236}">
+                <a16:creationId xmlns:a16="http://schemas.microsoft.com/office/drawing/2014/main" id="{13615F5B-351B-7AE2-4E48-A37A76BA44AE}"/>
+              </a:ext>
+            </a:extLst>
+          </p:cNvPr>
+          <p:cNvGraphicFramePr>
+            <a:graphicFrameLocks noGrp="1"/>
+          </p:cNvGraphicFramePr>
+          <p:nvPr>
+            <p:extLst>
+              <p:ext uri="{D42A27DB-BD31-4B8C-83A1-F6EECF244321}">
+                <p14:modId xmlns:p14="http://schemas.microsoft.com/office/powerpoint/2010/main" val="3155672949"/>
+              </p:ext>
+            </p:extLst>
+          </p:nvPr>
+        </p:nvGraphicFramePr>
+        <p:xfrm>
+          <a:off x="9753443" y="1432616"/>
+          <a:ext cx="1132467" cy="1061073"/>
+        </p:xfrm>
+        <a:graphic>
+          <a:graphicData uri="http://schemas.openxmlformats.org/drawingml/2006/table">
+            <a:tbl>
+              <a:tblPr/>
+              <a:tblGrid>
+                <a:gridCol w="377489">
+                  <a:extLst>
+                    <a:ext uri="{9D8B030D-6E8A-4147-A177-3AD203B41FA5}">
+                      <a16:colId xmlns:a16="http://schemas.microsoft.com/office/drawing/2014/main" val="520751035"/>
+                    </a:ext>
+                  </a:extLst>
+                </a:gridCol>
+                <a:gridCol w="377489">
+                  <a:extLst>
+                    <a:ext uri="{9D8B030D-6E8A-4147-A177-3AD203B41FA5}">
+                      <a16:colId xmlns:a16="http://schemas.microsoft.com/office/drawing/2014/main" val="162460214"/>
+                    </a:ext>
+                  </a:extLst>
+                </a:gridCol>
+                <a:gridCol w="377489">
+                  <a:extLst>
+                    <a:ext uri="{9D8B030D-6E8A-4147-A177-3AD203B41FA5}">
+                      <a16:colId xmlns:a16="http://schemas.microsoft.com/office/drawing/2014/main" val="3565137725"/>
+                    </a:ext>
+                  </a:extLst>
+                </a:gridCol>
+              </a:tblGrid>
+              <a:tr h="353691">
+                <a:tc>
+                  <a:txBody>
+                    <a:bodyPr/>
+                    <a:lstStyle/>
+                    <a:p>
+                      <a:pPr algn="ctr"/>
+                      <a:endParaRPr lang="en-DE" sz="1500" dirty="0">
+                        <a:highlight>
+                          <a:srgbClr val="000080"/>
+                        </a:highlight>
+                        <a:latin typeface="Courier New" panose="02070309020205020404" pitchFamily="49" charset="0"/>
+                        <a:cs typeface="Courier New" panose="02070309020205020404" pitchFamily="49" charset="0"/>
+                      </a:endParaRPr>
+                    </a:p>
+                  </a:txBody>
+                  <a:tcPr marL="106107" marR="106107" marT="53053" marB="53053" anchor="ctr">
+                    <a:lnL w="12700" cmpd="sng">
+                      <a:solidFill>
+                        <a:schemeClr val="tx1"/>
+                      </a:solidFill>
+                      <a:prstDash val="solid"/>
+                    </a:lnL>
+                    <a:lnR w="12700" cap="flat" cmpd="sng" algn="ctr">
+                      <a:solidFill>
+                        <a:schemeClr val="tx1"/>
+                      </a:solidFill>
+                      <a:prstDash val="solid"/>
+                      <a:round/>
+                      <a:headEnd type="none" w="med" len="med"/>
+                      <a:tailEnd type="none" w="med" len="med"/>
+                    </a:lnR>
+                    <a:lnT w="12700" cmpd="sng">
+                      <a:solidFill>
+                        <a:schemeClr val="tx1"/>
+                      </a:solidFill>
+                      <a:prstDash val="solid"/>
+                    </a:lnT>
+                    <a:lnB w="12700" cmpd="sng">
+                      <a:solidFill>
+                        <a:schemeClr val="tx1"/>
+                      </a:solidFill>
+                      <a:prstDash val="solid"/>
+                    </a:lnB>
+                    <a:solidFill>
+                      <a:srgbClr val="00FF02"/>
+                    </a:solidFill>
+                  </a:tcPr>
+                </a:tc>
+                <a:tc>
+                  <a:txBody>
+                    <a:bodyPr/>
+                    <a:lstStyle/>
+                    <a:p>
+                      <a:pPr algn="ctr"/>
+                      <a:endParaRPr lang="en-DE" sz="1500" dirty="0">
+                        <a:highlight>
+                          <a:srgbClr val="000080"/>
+                        </a:highlight>
+                        <a:latin typeface="Courier New" panose="02070309020205020404" pitchFamily="49" charset="0"/>
+                        <a:cs typeface="Courier New" panose="02070309020205020404" pitchFamily="49" charset="0"/>
+                      </a:endParaRPr>
+                    </a:p>
+                  </a:txBody>
+                  <a:tcPr marL="106107" marR="106107" marT="53053" marB="53053" anchor="ctr">
+                    <a:lnL w="12700" cmpd="sng">
+                      <a:solidFill>
+                        <a:schemeClr val="tx1"/>
+                      </a:solidFill>
+                      <a:prstDash val="solid"/>
+                    </a:lnL>
+                    <a:lnR w="12700" cap="flat" cmpd="sng" algn="ctr">
+                      <a:solidFill>
+                        <a:schemeClr val="tx1"/>
+                      </a:solidFill>
+                      <a:prstDash val="solid"/>
+                      <a:round/>
+                      <a:headEnd type="none" w="med" len="med"/>
+                      <a:tailEnd type="none" w="med" len="med"/>
+                    </a:lnR>
+                    <a:lnT w="12700" cmpd="sng">
+                      <a:solidFill>
+                        <a:schemeClr val="tx1"/>
+                      </a:solidFill>
+                      <a:prstDash val="solid"/>
+                    </a:lnT>
+                    <a:lnB w="12700" cap="flat" cmpd="sng" algn="ctr">
+                      <a:solidFill>
+                        <a:schemeClr val="tx1"/>
+                      </a:solidFill>
+                      <a:prstDash val="solid"/>
+                      <a:round/>
+                      <a:headEnd type="none" w="med" len="med"/>
+                      <a:tailEnd type="none" w="med" len="med"/>
+                    </a:lnB>
+                    <a:solidFill>
+                      <a:srgbClr val="00FF02"/>
+                    </a:solidFill>
+                  </a:tcPr>
+                </a:tc>
+                <a:tc>
+                  <a:txBody>
+                    <a:bodyPr/>
+                    <a:lstStyle/>
+                    <a:p>
+                      <a:pPr algn="ctr"/>
+                      <a:endParaRPr lang="en-DE" sz="1500" dirty="0">
+                        <a:highlight>
+                          <a:srgbClr val="000080"/>
+                        </a:highlight>
+                        <a:latin typeface="Courier New" panose="02070309020205020404" pitchFamily="49" charset="0"/>
+                        <a:cs typeface="Courier New" panose="02070309020205020404" pitchFamily="49" charset="0"/>
+                      </a:endParaRPr>
+                    </a:p>
+                  </a:txBody>
+                  <a:tcPr marL="106107" marR="106107" marT="53053" marB="53053" anchor="ctr">
+                    <a:lnL w="12700" cap="flat" cmpd="sng" algn="ctr">
+                      <a:solidFill>
+                        <a:schemeClr val="tx1"/>
+                      </a:solidFill>
+                      <a:prstDash val="solid"/>
+                      <a:round/>
+                      <a:headEnd type="none" w="med" len="med"/>
+                      <a:tailEnd type="none" w="med" len="med"/>
+                    </a:lnL>
+                    <a:lnR w="12700" cap="flat" cmpd="sng" algn="ctr">
+                      <a:solidFill>
+                        <a:schemeClr val="tx1"/>
+                      </a:solidFill>
+                      <a:prstDash val="solid"/>
+                      <a:round/>
+                      <a:headEnd type="none" w="med" len="med"/>
+                      <a:tailEnd type="none" w="med" len="med"/>
+                    </a:lnR>
+                    <a:lnT w="12700" cmpd="sng">
+                      <a:solidFill>
+                        <a:schemeClr val="tx1"/>
+                      </a:solidFill>
+                      <a:prstDash val="solid"/>
+                    </a:lnT>
+                    <a:lnB w="12700" cap="flat" cmpd="sng" algn="ctr">
+                      <a:solidFill>
+                        <a:schemeClr val="tx1"/>
+                      </a:solidFill>
+                      <a:prstDash val="solid"/>
+                      <a:round/>
+                      <a:headEnd type="none" w="med" len="med"/>
+                      <a:tailEnd type="none" w="med" len="med"/>
+                    </a:lnB>
+                    <a:solidFill>
+                      <a:srgbClr val="00FF02"/>
+                    </a:solidFill>
+                  </a:tcPr>
+                </a:tc>
+                <a:extLst>
+                  <a:ext uri="{0D108BD9-81ED-4DB2-BD59-A6C34878D82A}">
+                    <a16:rowId xmlns:a16="http://schemas.microsoft.com/office/drawing/2014/main" val="3835059969"/>
+                  </a:ext>
+                </a:extLst>
+              </a:tr>
+              <a:tr h="353691">
+                <a:tc>
+                  <a:txBody>
+                    <a:bodyPr/>
+                    <a:lstStyle/>
+                    <a:p>
+                      <a:pPr algn="ctr"/>
+                      <a:endParaRPr lang="en-DE" sz="1500" dirty="0">
+                        <a:highlight>
+                          <a:srgbClr val="000080"/>
+                        </a:highlight>
+                        <a:latin typeface="Courier New" panose="02070309020205020404" pitchFamily="49" charset="0"/>
+                        <a:cs typeface="Courier New" panose="02070309020205020404" pitchFamily="49" charset="0"/>
+                      </a:endParaRPr>
+                    </a:p>
+                  </a:txBody>
+                  <a:tcPr marL="106107" marR="106107" marT="53053" marB="53053" anchor="ctr">
+                    <a:lnL w="12700" cmpd="sng">
+                      <a:solidFill>
+                        <a:schemeClr val="tx1"/>
+                      </a:solidFill>
+                      <a:prstDash val="solid"/>
+                    </a:lnL>
+                    <a:lnR w="12700" cap="flat" cmpd="sng" algn="ctr">
+                      <a:solidFill>
+                        <a:schemeClr val="tx1"/>
+                      </a:solidFill>
+                      <a:prstDash val="solid"/>
+                      <a:round/>
+                      <a:headEnd type="none" w="med" len="med"/>
+                      <a:tailEnd type="none" w="med" len="med"/>
+                    </a:lnR>
+                    <a:lnT w="12700" cap="flat" cmpd="sng" algn="ctr">
+                      <a:solidFill>
+                        <a:schemeClr val="tx1"/>
+                      </a:solidFill>
+                      <a:prstDash val="solid"/>
+                      <a:round/>
+                      <a:headEnd type="none" w="med" len="med"/>
+                      <a:tailEnd type="none" w="med" len="med"/>
+                    </a:lnT>
+                    <a:lnB w="12700" cmpd="sng">
+                      <a:solidFill>
+                        <a:schemeClr val="tx1"/>
+                      </a:solidFill>
+                      <a:prstDash val="solid"/>
+                    </a:lnB>
+                    <a:solidFill>
+                      <a:srgbClr val="00FF02"/>
+                    </a:solidFill>
+                  </a:tcPr>
+                </a:tc>
+                <a:tc>
+                  <a:txBody>
+                    <a:bodyPr/>
+                    <a:lstStyle/>
+                    <a:p>
+                      <a:pPr algn="ctr"/>
+                      <a:endParaRPr lang="en-DE" sz="1500" dirty="0">
+                        <a:highlight>
+                          <a:srgbClr val="000080"/>
+                        </a:highlight>
+                        <a:latin typeface="Courier New" panose="02070309020205020404" pitchFamily="49" charset="0"/>
+                        <a:cs typeface="Courier New" panose="02070309020205020404" pitchFamily="49" charset="0"/>
+                      </a:endParaRPr>
+                    </a:p>
+                  </a:txBody>
+                  <a:tcPr marL="106107" marR="106107" marT="53053" marB="53053" anchor="ctr">
+                    <a:lnL w="12700" cmpd="sng">
+                      <a:solidFill>
+                        <a:schemeClr val="tx1"/>
+                      </a:solidFill>
+                      <a:prstDash val="solid"/>
+                    </a:lnL>
+                    <a:lnR w="12700" cap="flat" cmpd="sng" algn="ctr">
+                      <a:solidFill>
+                        <a:schemeClr val="tx1"/>
+                      </a:solidFill>
+                      <a:prstDash val="solid"/>
+                      <a:round/>
+                      <a:headEnd type="none" w="med" len="med"/>
+                      <a:tailEnd type="none" w="med" len="med"/>
+                    </a:lnR>
+                    <a:lnT w="12700" cap="flat" cmpd="sng" algn="ctr">
+                      <a:solidFill>
+                        <a:schemeClr val="tx1"/>
+                      </a:solidFill>
+                      <a:prstDash val="solid"/>
+                      <a:round/>
+                      <a:headEnd type="none" w="med" len="med"/>
+                      <a:tailEnd type="none" w="med" len="med"/>
+                    </a:lnT>
+                    <a:lnB w="12700" cap="flat" cmpd="sng" algn="ctr">
+                      <a:solidFill>
+                        <a:schemeClr val="tx1"/>
+                      </a:solidFill>
+                      <a:prstDash val="solid"/>
+                      <a:round/>
+                      <a:headEnd type="none" w="med" len="med"/>
+                      <a:tailEnd type="none" w="med" len="med"/>
+                    </a:lnB>
+                    <a:solidFill>
+                      <a:srgbClr val="00FF02"/>
+                    </a:solidFill>
+                  </a:tcPr>
+                </a:tc>
+                <a:tc>
+                  <a:txBody>
+                    <a:bodyPr/>
+                    <a:lstStyle/>
+                    <a:p>
+                      <a:pPr algn="ctr"/>
+                      <a:endParaRPr lang="en-DE" sz="1500" dirty="0">
+                        <a:highlight>
+                          <a:srgbClr val="000080"/>
+                        </a:highlight>
+                        <a:latin typeface="Courier New" panose="02070309020205020404" pitchFamily="49" charset="0"/>
+                        <a:cs typeface="Courier New" panose="02070309020205020404" pitchFamily="49" charset="0"/>
+                      </a:endParaRPr>
+                    </a:p>
+                  </a:txBody>
+                  <a:tcPr marL="106107" marR="106107" marT="53053" marB="53053" anchor="ctr">
+                    <a:lnL w="12700" cap="flat" cmpd="sng" algn="ctr">
+                      <a:solidFill>
+                        <a:schemeClr val="tx1"/>
+                      </a:solidFill>
+                      <a:prstDash val="solid"/>
+                      <a:round/>
+                      <a:headEnd type="none" w="med" len="med"/>
+                      <a:tailEnd type="none" w="med" len="med"/>
+                    </a:lnL>
+                    <a:lnR w="12700" cap="flat" cmpd="sng" algn="ctr">
+                      <a:solidFill>
+                        <a:schemeClr val="tx1"/>
+                      </a:solidFill>
+                      <a:prstDash val="solid"/>
+                      <a:round/>
+                      <a:headEnd type="none" w="med" len="med"/>
+                      <a:tailEnd type="none" w="med" len="med"/>
+                    </a:lnR>
+                    <a:lnT w="12700" cap="flat" cmpd="sng" algn="ctr">
+                      <a:solidFill>
+                        <a:schemeClr val="tx1"/>
+                      </a:solidFill>
+                      <a:prstDash val="solid"/>
+                      <a:round/>
+                      <a:headEnd type="none" w="med" len="med"/>
+                      <a:tailEnd type="none" w="med" len="med"/>
+                    </a:lnT>
+                    <a:lnB w="12700" cap="flat" cmpd="sng" algn="ctr">
+                      <a:solidFill>
+                        <a:schemeClr val="tx1"/>
+                      </a:solidFill>
+                      <a:prstDash val="solid"/>
+                      <a:round/>
+                      <a:headEnd type="none" w="med" len="med"/>
+                      <a:tailEnd type="none" w="med" len="med"/>
+                    </a:lnB>
+                    <a:solidFill>
+                      <a:srgbClr val="00FF02"/>
+                    </a:solidFill>
+                  </a:tcPr>
+                </a:tc>
+                <a:extLst>
+                  <a:ext uri="{0D108BD9-81ED-4DB2-BD59-A6C34878D82A}">
+                    <a16:rowId xmlns:a16="http://schemas.microsoft.com/office/drawing/2014/main" val="3477651988"/>
+                  </a:ext>
+                </a:extLst>
+              </a:tr>
+              <a:tr h="353691">
+                <a:tc>
+                  <a:txBody>
+                    <a:bodyPr/>
+                    <a:lstStyle/>
+                    <a:p>
+                      <a:pPr algn="ctr"/>
+                      <a:endParaRPr lang="en-DE" sz="1500" dirty="0">
+                        <a:highlight>
+                          <a:srgbClr val="000080"/>
+                        </a:highlight>
+                        <a:latin typeface="Courier New" panose="02070309020205020404" pitchFamily="49" charset="0"/>
+                        <a:cs typeface="Courier New" panose="02070309020205020404" pitchFamily="49" charset="0"/>
+                      </a:endParaRPr>
+                    </a:p>
+                  </a:txBody>
+                  <a:tcPr marL="106107" marR="106107" marT="53053" marB="53053" anchor="ctr">
+                    <a:lnL w="12700" cmpd="sng">
+                      <a:solidFill>
+                        <a:schemeClr val="tx1"/>
+                      </a:solidFill>
+                      <a:prstDash val="solid"/>
+                    </a:lnL>
+                    <a:lnR w="12700" cap="flat" cmpd="sng" algn="ctr">
+                      <a:solidFill>
+                        <a:schemeClr val="tx1"/>
+                      </a:solidFill>
+                      <a:prstDash val="solid"/>
+                      <a:round/>
+                      <a:headEnd type="none" w="med" len="med"/>
+                      <a:tailEnd type="none" w="med" len="med"/>
+                    </a:lnR>
+                    <a:lnT w="12700" cap="flat" cmpd="sng" algn="ctr">
+                      <a:solidFill>
+                        <a:schemeClr val="tx1"/>
+                      </a:solidFill>
+                      <a:prstDash val="solid"/>
+                      <a:round/>
+                      <a:headEnd type="none" w="med" len="med"/>
+                      <a:tailEnd type="none" w="med" len="med"/>
+                    </a:lnT>
+                    <a:lnB w="12700" cap="flat" cmpd="sng" algn="ctr">
+                      <a:solidFill>
+                        <a:schemeClr val="tx1"/>
+                      </a:solidFill>
+                      <a:prstDash val="solid"/>
+                      <a:round/>
+                      <a:headEnd type="none" w="med" len="med"/>
+                      <a:tailEnd type="none" w="med" len="med"/>
+                    </a:lnB>
+                    <a:solidFill>
+                      <a:srgbClr val="00FF02"/>
+                    </a:solidFill>
+                  </a:tcPr>
+                </a:tc>
+                <a:tc>
+                  <a:txBody>
+                    <a:bodyPr/>
+                    <a:lstStyle/>
+                    <a:p>
+                      <a:pPr algn="ctr"/>
+                      <a:endParaRPr lang="en-DE" sz="1500" dirty="0">
+                        <a:highlight>
+                          <a:srgbClr val="000080"/>
+                        </a:highlight>
+                        <a:latin typeface="Courier New" panose="02070309020205020404" pitchFamily="49" charset="0"/>
+                        <a:cs typeface="Courier New" panose="02070309020205020404" pitchFamily="49" charset="0"/>
+                      </a:endParaRPr>
+                    </a:p>
+                  </a:txBody>
+                  <a:tcPr marL="106107" marR="106107" marT="53053" marB="53053" anchor="ctr">
+                    <a:lnL w="12700" cmpd="sng">
+                      <a:solidFill>
+                        <a:schemeClr val="tx1"/>
+                      </a:solidFill>
+                      <a:prstDash val="solid"/>
+                    </a:lnL>
+                    <a:lnR w="12700" cap="flat" cmpd="sng" algn="ctr">
+                      <a:solidFill>
+                        <a:schemeClr val="tx1"/>
+                      </a:solidFill>
+                      <a:prstDash val="solid"/>
+                      <a:round/>
+                      <a:headEnd type="none" w="med" len="med"/>
+                      <a:tailEnd type="none" w="med" len="med"/>
+                    </a:lnR>
+                    <a:lnT w="12700" cap="flat" cmpd="sng" algn="ctr">
+                      <a:solidFill>
+                        <a:schemeClr val="tx1"/>
+                      </a:solidFill>
+                      <a:prstDash val="solid"/>
+                      <a:round/>
+                      <a:headEnd type="none" w="med" len="med"/>
+                      <a:tailEnd type="none" w="med" len="med"/>
+                    </a:lnT>
+                    <a:lnB w="12700" cap="flat" cmpd="sng" algn="ctr">
+                      <a:solidFill>
+                        <a:schemeClr val="tx1"/>
+                      </a:solidFill>
+                      <a:prstDash val="solid"/>
+                      <a:round/>
+                      <a:headEnd type="none" w="med" len="med"/>
+                      <a:tailEnd type="none" w="med" len="med"/>
+                    </a:lnB>
+                    <a:solidFill>
+                      <a:srgbClr val="00FF02"/>
+                    </a:solidFill>
+                  </a:tcPr>
+                </a:tc>
+                <a:tc>
+                  <a:txBody>
+                    <a:bodyPr/>
+                    <a:lstStyle/>
+                    <a:p>
+                      <a:pPr algn="ctr"/>
+                      <a:endParaRPr lang="en-DE" sz="1500" dirty="0">
+                        <a:highlight>
+                          <a:srgbClr val="000080"/>
+                        </a:highlight>
+                        <a:latin typeface="Courier New" panose="02070309020205020404" pitchFamily="49" charset="0"/>
+                        <a:cs typeface="Courier New" panose="02070309020205020404" pitchFamily="49" charset="0"/>
+                      </a:endParaRPr>
+                    </a:p>
+                  </a:txBody>
+                  <a:tcPr marL="106107" marR="106107" marT="53053" marB="53053" anchor="ctr">
+                    <a:lnL w="12700" cap="flat" cmpd="sng" algn="ctr">
+                      <a:solidFill>
+                        <a:schemeClr val="tx1"/>
+                      </a:solidFill>
+                      <a:prstDash val="solid"/>
+                      <a:round/>
+                      <a:headEnd type="none" w="med" len="med"/>
+                      <a:tailEnd type="none" w="med" len="med"/>
+                    </a:lnL>
+                    <a:lnR w="12700" cap="flat" cmpd="sng" algn="ctr">
+                      <a:solidFill>
+                        <a:schemeClr val="tx1"/>
+                      </a:solidFill>
+                      <a:prstDash val="solid"/>
+                      <a:round/>
+                      <a:headEnd type="none" w="med" len="med"/>
+                      <a:tailEnd type="none" w="med" len="med"/>
+                    </a:lnR>
+                    <a:lnT w="12700" cap="flat" cmpd="sng" algn="ctr">
+                      <a:solidFill>
+                        <a:schemeClr val="tx1"/>
+                      </a:solidFill>
+                      <a:prstDash val="solid"/>
+                      <a:round/>
+                      <a:headEnd type="none" w="med" len="med"/>
+                      <a:tailEnd type="none" w="med" len="med"/>
+                    </a:lnT>
+                    <a:lnB w="12700" cap="flat" cmpd="sng" algn="ctr">
+                      <a:solidFill>
+                        <a:schemeClr val="tx1"/>
+                      </a:solidFill>
+                      <a:prstDash val="solid"/>
+                      <a:round/>
+                      <a:headEnd type="none" w="med" len="med"/>
+                      <a:tailEnd type="none" w="med" len="med"/>
+                    </a:lnB>
+                    <a:solidFill>
+                      <a:srgbClr val="00FF02"/>
+                    </a:solidFill>
+                  </a:tcPr>
+                </a:tc>
+                <a:extLst>
+                  <a:ext uri="{0D108BD9-81ED-4DB2-BD59-A6C34878D82A}">
+                    <a16:rowId xmlns:a16="http://schemas.microsoft.com/office/drawing/2014/main" val="2002121677"/>
+                  </a:ext>
+                </a:extLst>
+              </a:tr>
+            </a:tbl>
+          </a:graphicData>
+        </a:graphic>
+      </p:graphicFrame>
+      <p:sp>
+        <p:nvSpPr>
+          <p:cNvPr id="26" name="TextBox 25">
+            <a:extLst>
+              <a:ext uri="{FF2B5EF4-FFF2-40B4-BE49-F238E27FC236}">
+                <a16:creationId xmlns:a16="http://schemas.microsoft.com/office/drawing/2014/main" id="{7772186F-4609-2F3A-70E0-24726ECB0934}"/>
+              </a:ext>
+            </a:extLst>
+          </p:cNvPr>
+          <p:cNvSpPr txBox="1"/>
+          <p:nvPr/>
+        </p:nvSpPr>
+        <p:spPr>
+          <a:xfrm>
+            <a:off x="10082570" y="4336381"/>
+            <a:ext cx="646331" cy="400110"/>
+          </a:xfrm>
+          <a:prstGeom prst="rect">
+            <a:avLst/>
+          </a:prstGeom>
+          <a:noFill/>
+        </p:spPr>
+        <p:txBody>
+          <a:bodyPr wrap="none" rtlCol="0">
+            <a:spAutoFit/>
+          </a:bodyPr>
+          <a:lstStyle/>
+          <a:p>
+            <a:r>
+              <a:rPr lang="en-US" sz="2000" dirty="0">
+                <a:latin typeface="Courier New" panose="02070309020205020404" pitchFamily="49" charset="0"/>
+                <a:cs typeface="Courier New" panose="02070309020205020404" pitchFamily="49" charset="0"/>
+              </a:rPr>
+              <a:t>1/</a:t>
+            </a:r>
+            <a:r>
+              <a:rPr lang="en-US" sz="2000" dirty="0">
+                <a:highlight>
+                  <a:srgbClr val="00FF00"/>
+                </a:highlight>
+                <a:latin typeface="Courier New" panose="02070309020205020404" pitchFamily="49" charset="0"/>
+                <a:cs typeface="Courier New" panose="02070309020205020404" pitchFamily="49" charset="0"/>
+              </a:rPr>
+              <a:t>0</a:t>
+            </a:r>
+            <a:endParaRPr lang="en-DE" sz="2000" dirty="0">
+              <a:highlight>
+                <a:srgbClr val="00FF00"/>
+              </a:highlight>
+              <a:latin typeface="Courier New" panose="02070309020205020404" pitchFamily="49" charset="0"/>
+              <a:cs typeface="Courier New" panose="02070309020205020404" pitchFamily="49" charset="0"/>
+            </a:endParaRPr>
+          </a:p>
+        </p:txBody>
+      </p:sp>
+      <p:sp>
+        <p:nvSpPr>
+          <p:cNvPr id="28" name="TextBox 27">
+            <a:extLst>
+              <a:ext uri="{FF2B5EF4-FFF2-40B4-BE49-F238E27FC236}">
+                <a16:creationId xmlns:a16="http://schemas.microsoft.com/office/drawing/2014/main" id="{1B0662ED-6854-BA0F-4541-BA06A6D6CD8E}"/>
+              </a:ext>
+            </a:extLst>
+          </p:cNvPr>
+          <p:cNvSpPr txBox="1"/>
+          <p:nvPr/>
+        </p:nvSpPr>
+        <p:spPr>
+          <a:xfrm>
+            <a:off x="525585" y="3959286"/>
+            <a:ext cx="4527148" cy="2308324"/>
+          </a:xfrm>
+          <a:prstGeom prst="rect">
+            <a:avLst/>
+          </a:prstGeom>
+          <a:noFill/>
+        </p:spPr>
+        <p:txBody>
+          <a:bodyPr wrap="square" rtlCol="0">
+            <a:spAutoFit/>
+          </a:bodyPr>
+          <a:lstStyle/>
+          <a:p>
+            <a:r>
+              <a:rPr lang="en-GB" sz="1200" dirty="0">
+                <a:latin typeface="Courier New" panose="02070309020205020404" pitchFamily="49" charset="0"/>
+                <a:cs typeface="Courier New" panose="02070309020205020404" pitchFamily="49" charset="0"/>
+              </a:rPr>
+              <a:t>"axes": [ {"name": "t", "type": "time", "unit": "millisecond"}, {"name": "c", "type": "channel"}, {"name": "z", "type": "space", "unit": "</a:t>
+            </a:r>
+            <a:r>
+              <a:rPr lang="en-GB" sz="1200" dirty="0" err="1">
+                <a:latin typeface="Courier New" panose="02070309020205020404" pitchFamily="49" charset="0"/>
+                <a:cs typeface="Courier New" panose="02070309020205020404" pitchFamily="49" charset="0"/>
+              </a:rPr>
+              <a:t>micrometer</a:t>
+            </a:r>
+            <a:r>
+              <a:rPr lang="en-GB" sz="1200" dirty="0">
+                <a:latin typeface="Courier New" panose="02070309020205020404" pitchFamily="49" charset="0"/>
+                <a:cs typeface="Courier New" panose="02070309020205020404" pitchFamily="49" charset="0"/>
+              </a:rPr>
+              <a:t>"}, {"name": "y", "type": "space", "unit": "</a:t>
+            </a:r>
+            <a:r>
+              <a:rPr lang="en-GB" sz="1200" dirty="0" err="1">
+                <a:latin typeface="Courier New" panose="02070309020205020404" pitchFamily="49" charset="0"/>
+                <a:cs typeface="Courier New" panose="02070309020205020404" pitchFamily="49" charset="0"/>
+              </a:rPr>
+              <a:t>micrometer</a:t>
+            </a:r>
+            <a:r>
+              <a:rPr lang="en-GB" sz="1200" dirty="0">
+                <a:latin typeface="Courier New" panose="02070309020205020404" pitchFamily="49" charset="0"/>
+                <a:cs typeface="Courier New" panose="02070309020205020404" pitchFamily="49" charset="0"/>
+              </a:rPr>
+              <a:t>"}, {"name": "x", "type": "space", "unit": "</a:t>
+            </a:r>
+            <a:r>
+              <a:rPr lang="en-GB" sz="1200" dirty="0" err="1">
+                <a:latin typeface="Courier New" panose="02070309020205020404" pitchFamily="49" charset="0"/>
+                <a:cs typeface="Courier New" panose="02070309020205020404" pitchFamily="49" charset="0"/>
+              </a:rPr>
+              <a:t>micrometer</a:t>
+            </a:r>
+            <a:r>
+              <a:rPr lang="en-GB" sz="1200" dirty="0">
+                <a:latin typeface="Courier New" panose="02070309020205020404" pitchFamily="49" charset="0"/>
+                <a:cs typeface="Courier New" panose="02070309020205020404" pitchFamily="49" charset="0"/>
+              </a:rPr>
+              <a:t>"} ],</a:t>
+            </a:r>
+            <a:r>
+              <a:rPr lang="en-GB" sz="1200" dirty="0"/>
+              <a:t> </a:t>
+            </a:r>
+            <a:r>
+              <a:rPr lang="en-GB" sz="1200" dirty="0">
+                <a:latin typeface="Courier New" panose="02070309020205020404" pitchFamily="49" charset="0"/>
+                <a:cs typeface="Courier New" panose="02070309020205020404" pitchFamily="49" charset="0"/>
+              </a:rPr>
+              <a:t>"datasets": [ { "path": "0", "</a:t>
+            </a:r>
+            <a:r>
+              <a:rPr lang="en-GB" sz="1200" dirty="0" err="1">
+                <a:latin typeface="Courier New" panose="02070309020205020404" pitchFamily="49" charset="0"/>
+                <a:cs typeface="Courier New" panose="02070309020205020404" pitchFamily="49" charset="0"/>
+              </a:rPr>
+              <a:t>coordinateTransformations</a:t>
+            </a:r>
+            <a:r>
+              <a:rPr lang="en-GB" sz="1200" dirty="0">
+                <a:latin typeface="Courier New" panose="02070309020205020404" pitchFamily="49" charset="0"/>
+                <a:cs typeface="Courier New" panose="02070309020205020404" pitchFamily="49" charset="0"/>
+              </a:rPr>
+              <a:t>": [{"type": "scale", "scale": [1.0, 1.0, 0.5, 0.5, 0.5] }] }, { "path": "1", "</a:t>
+            </a:r>
+            <a:r>
+              <a:rPr lang="en-GB" sz="1200" dirty="0" err="1">
+                <a:latin typeface="Courier New" panose="02070309020205020404" pitchFamily="49" charset="0"/>
+                <a:cs typeface="Courier New" panose="02070309020205020404" pitchFamily="49" charset="0"/>
+              </a:rPr>
+              <a:t>coordinateTransformations</a:t>
+            </a:r>
+            <a:r>
+              <a:rPr lang="en-GB" sz="1200" dirty="0">
+                <a:latin typeface="Courier New" panose="02070309020205020404" pitchFamily="49" charset="0"/>
+                <a:cs typeface="Courier New" panose="02070309020205020404" pitchFamily="49" charset="0"/>
+              </a:rPr>
+              <a:t>": [{"type": "scale", "scale": [1.0, 1.0, 1.0, 1.0, 1.0] }] }, …</a:t>
+            </a:r>
+            <a:endParaRPr lang="en-DE" sz="1200" dirty="0">
+              <a:latin typeface="Courier New" panose="02070309020205020404" pitchFamily="49" charset="0"/>
+              <a:cs typeface="Courier New" panose="02070309020205020404" pitchFamily="49" charset="0"/>
+            </a:endParaRPr>
+          </a:p>
+        </p:txBody>
+      </p:sp>
+      <p:sp>
+        <p:nvSpPr>
+          <p:cNvPr id="3" name="TextBox 2">
+            <a:extLst>
+              <a:ext uri="{FF2B5EF4-FFF2-40B4-BE49-F238E27FC236}">
+                <a16:creationId xmlns:a16="http://schemas.microsoft.com/office/drawing/2014/main" id="{BCFFDC25-2622-2215-A911-F1356089F26D}"/>
+              </a:ext>
+            </a:extLst>
+          </p:cNvPr>
+          <p:cNvSpPr txBox="1"/>
+          <p:nvPr/>
+        </p:nvSpPr>
+        <p:spPr>
+          <a:xfrm>
+            <a:off x="7750418" y="3559176"/>
+            <a:ext cx="1996476" cy="369332"/>
+          </a:xfrm>
+          <a:prstGeom prst="rect">
+            <a:avLst/>
+          </a:prstGeom>
+          <a:noFill/>
+        </p:spPr>
+        <p:txBody>
+          <a:bodyPr wrap="square">
+            <a:spAutoFit/>
+          </a:bodyPr>
+          <a:lstStyle/>
+          <a:p>
+            <a:r>
+              <a:rPr lang="en-US" sz="1800" dirty="0">
+                <a:latin typeface="Calibri" panose="020F0502020204030204" pitchFamily="34" charset="0"/>
+                <a:cs typeface="Calibri" panose="020F0502020204030204" pitchFamily="34" charset="0"/>
+              </a:rPr>
+              <a:t>Resolution folders</a:t>
+            </a:r>
+          </a:p>
+        </p:txBody>
+      </p:sp>
+      <p:cxnSp>
+        <p:nvCxnSpPr>
+          <p:cNvPr id="6" name="Straight Arrow Connector 5">
+            <a:extLst>
+              <a:ext uri="{FF2B5EF4-FFF2-40B4-BE49-F238E27FC236}">
+                <a16:creationId xmlns:a16="http://schemas.microsoft.com/office/drawing/2014/main" id="{C2D716B8-3891-6CDA-C57E-F237206A96B2}"/>
+              </a:ext>
+            </a:extLst>
+          </p:cNvPr>
+          <p:cNvCxnSpPr>
+            <a:stCxn id="3" idx="1"/>
+          </p:cNvCxnSpPr>
+          <p:nvPr/>
+        </p:nvCxnSpPr>
+        <p:spPr>
+          <a:xfrm flipH="1">
+            <a:off x="7100047" y="3743842"/>
+            <a:ext cx="650371" cy="592539"/>
+          </a:xfrm>
+          <a:prstGeom prst="straightConnector1">
+            <a:avLst/>
+          </a:prstGeom>
+          <a:ln>
+            <a:tailEnd type="triangle"/>
+          </a:ln>
+        </p:spPr>
+        <p:style>
+          <a:lnRef idx="1">
+            <a:schemeClr val="accent1"/>
+          </a:lnRef>
+          <a:fillRef idx="0">
+            <a:schemeClr val="accent1"/>
+          </a:fillRef>
+          <a:effectRef idx="0">
+            <a:schemeClr val="accent1"/>
+          </a:effectRef>
+          <a:fontRef idx="minor">
+            <a:schemeClr val="tx1"/>
+          </a:fontRef>
+        </p:style>
+      </p:cxnSp>
+      <p:cxnSp>
+        <p:nvCxnSpPr>
+          <p:cNvPr id="12" name="Straight Arrow Connector 11">
+            <a:extLst>
+              <a:ext uri="{FF2B5EF4-FFF2-40B4-BE49-F238E27FC236}">
+                <a16:creationId xmlns:a16="http://schemas.microsoft.com/office/drawing/2014/main" id="{3330F2BD-EA4B-7019-E65E-D9A3F93E673A}"/>
+              </a:ext>
+            </a:extLst>
+          </p:cNvPr>
+          <p:cNvCxnSpPr>
+            <a:cxnSpLocks/>
+          </p:cNvCxnSpPr>
+          <p:nvPr/>
+        </p:nvCxnSpPr>
+        <p:spPr>
+          <a:xfrm>
+            <a:off x="9624290" y="3759231"/>
+            <a:ext cx="585594" cy="577150"/>
+          </a:xfrm>
+          <a:prstGeom prst="straightConnector1">
+            <a:avLst/>
+          </a:prstGeom>
+          <a:ln>
+            <a:tailEnd type="triangle"/>
+          </a:ln>
+        </p:spPr>
+        <p:style>
+          <a:lnRef idx="1">
+            <a:schemeClr val="accent1"/>
+          </a:lnRef>
+          <a:fillRef idx="0">
+            <a:schemeClr val="accent1"/>
+          </a:fillRef>
+          <a:effectRef idx="0">
+            <a:schemeClr val="accent1"/>
+          </a:effectRef>
+          <a:fontRef idx="minor">
+            <a:schemeClr val="tx1"/>
+          </a:fontRef>
+        </p:style>
+      </p:cxnSp>
+      <p:sp>
+        <p:nvSpPr>
+          <p:cNvPr id="19" name="TextBox 18">
+            <a:extLst>
+              <a:ext uri="{FF2B5EF4-FFF2-40B4-BE49-F238E27FC236}">
+                <a16:creationId xmlns:a16="http://schemas.microsoft.com/office/drawing/2014/main" id="{2B29EDB9-6C00-67A2-69B3-9E1E62B041D1}"/>
+              </a:ext>
+            </a:extLst>
+          </p:cNvPr>
+          <p:cNvSpPr txBox="1"/>
+          <p:nvPr/>
+        </p:nvSpPr>
+        <p:spPr>
+          <a:xfrm>
+            <a:off x="8566654" y="5684331"/>
+            <a:ext cx="1825233" cy="369332"/>
+          </a:xfrm>
+          <a:prstGeom prst="rect">
+            <a:avLst/>
+          </a:prstGeom>
+          <a:noFill/>
+        </p:spPr>
+        <p:txBody>
+          <a:bodyPr wrap="square">
+            <a:spAutoFit/>
+          </a:bodyPr>
+          <a:lstStyle/>
+          <a:p>
+            <a:r>
+              <a:rPr lang="en-US" dirty="0">
+                <a:latin typeface="Calibri" panose="020F0502020204030204" pitchFamily="34" charset="0"/>
+                <a:cs typeface="Calibri" panose="020F0502020204030204" pitchFamily="34" charset="0"/>
+              </a:rPr>
+              <a:t>Binary chunk files</a:t>
+            </a:r>
+            <a:endParaRPr lang="en-US" sz="1800" dirty="0">
+              <a:latin typeface="Calibri" panose="020F0502020204030204" pitchFamily="34" charset="0"/>
+              <a:cs typeface="Calibri" panose="020F0502020204030204" pitchFamily="34" charset="0"/>
+            </a:endParaRPr>
+          </a:p>
+        </p:txBody>
+      </p:sp>
+      <p:cxnSp>
+        <p:nvCxnSpPr>
+          <p:cNvPr id="21" name="Straight Arrow Connector 20">
+            <a:extLst>
+              <a:ext uri="{FF2B5EF4-FFF2-40B4-BE49-F238E27FC236}">
+                <a16:creationId xmlns:a16="http://schemas.microsoft.com/office/drawing/2014/main" id="{0460106C-533B-5526-92FE-E6299951E151}"/>
+              </a:ext>
+            </a:extLst>
+          </p:cNvPr>
+          <p:cNvCxnSpPr>
+            <a:cxnSpLocks/>
+            <a:stCxn id="19" idx="1"/>
+          </p:cNvCxnSpPr>
+          <p:nvPr/>
+        </p:nvCxnSpPr>
+        <p:spPr>
+          <a:xfrm flipH="1" flipV="1">
+            <a:off x="7650336" y="5524531"/>
+            <a:ext cx="916318" cy="344466"/>
+          </a:xfrm>
+          <a:prstGeom prst="straightConnector1">
+            <a:avLst/>
+          </a:prstGeom>
+          <a:ln>
+            <a:tailEnd type="triangle"/>
+          </a:ln>
+        </p:spPr>
+        <p:style>
+          <a:lnRef idx="1">
+            <a:schemeClr val="accent1"/>
+          </a:lnRef>
+          <a:fillRef idx="0">
+            <a:schemeClr val="accent1"/>
+          </a:fillRef>
+          <a:effectRef idx="0">
+            <a:schemeClr val="accent1"/>
+          </a:effectRef>
+          <a:fontRef idx="minor">
+            <a:schemeClr val="tx1"/>
+          </a:fontRef>
+        </p:style>
+      </p:cxnSp>
+      <p:cxnSp>
+        <p:nvCxnSpPr>
+          <p:cNvPr id="29" name="Straight Arrow Connector 28">
+            <a:extLst>
+              <a:ext uri="{FF2B5EF4-FFF2-40B4-BE49-F238E27FC236}">
+                <a16:creationId xmlns:a16="http://schemas.microsoft.com/office/drawing/2014/main" id="{B34E5073-6893-8332-D2B2-B8C0800F0F6A}"/>
+              </a:ext>
+            </a:extLst>
+          </p:cNvPr>
+          <p:cNvCxnSpPr>
+            <a:cxnSpLocks/>
+            <a:stCxn id="19" idx="3"/>
+          </p:cNvCxnSpPr>
+          <p:nvPr/>
+        </p:nvCxnSpPr>
+        <p:spPr>
+          <a:xfrm flipV="1">
+            <a:off x="10391887" y="4941516"/>
+            <a:ext cx="171243" cy="927481"/>
+          </a:xfrm>
+          <a:prstGeom prst="straightConnector1">
+            <a:avLst/>
+          </a:prstGeom>
+          <a:ln>
+            <a:tailEnd type="triangle"/>
+          </a:ln>
+        </p:spPr>
+        <p:style>
+          <a:lnRef idx="1">
+            <a:schemeClr val="accent1"/>
+          </a:lnRef>
+          <a:fillRef idx="0">
+            <a:schemeClr val="accent1"/>
+          </a:fillRef>
+          <a:effectRef idx="0">
+            <a:schemeClr val="accent1"/>
+          </a:effectRef>
+          <a:fontRef idx="minor">
+            <a:schemeClr val="tx1"/>
+          </a:fontRef>
+        </p:style>
+      </p:cxnSp>
+      <p:sp>
+        <p:nvSpPr>
+          <p:cNvPr id="39" name="TextBox 38">
+            <a:extLst>
+              <a:ext uri="{FF2B5EF4-FFF2-40B4-BE49-F238E27FC236}">
+                <a16:creationId xmlns:a16="http://schemas.microsoft.com/office/drawing/2014/main" id="{29A33973-122F-A1C9-CF18-8CCEC023325B}"/>
+              </a:ext>
+            </a:extLst>
+          </p:cNvPr>
+          <p:cNvSpPr txBox="1"/>
+          <p:nvPr/>
+        </p:nvSpPr>
+        <p:spPr>
+          <a:xfrm>
+            <a:off x="589397" y="947055"/>
+            <a:ext cx="4122452" cy="1754326"/>
+          </a:xfrm>
+          <a:prstGeom prst="rect">
+            <a:avLst/>
+          </a:prstGeom>
+          <a:noFill/>
+        </p:spPr>
+        <p:txBody>
+          <a:bodyPr wrap="square" rtlCol="0">
+            <a:spAutoFit/>
+          </a:bodyPr>
+          <a:lstStyle/>
+          <a:p>
+            <a:pPr marL="342900" indent="-342900">
+              <a:buFont typeface="Arial" panose="020B0604020202020204" pitchFamily="34" charset="0"/>
+              <a:buChar char="•"/>
+            </a:pPr>
+            <a:r>
+              <a:rPr lang="en-US" dirty="0">
+                <a:latin typeface="Calibri" panose="020F0502020204030204" pitchFamily="34" charset="0"/>
+                <a:cs typeface="Calibri" panose="020F0502020204030204" pitchFamily="34" charset="0"/>
+              </a:rPr>
+              <a:t>OME-Zarr builds on ZARR:</a:t>
+            </a:r>
+          </a:p>
+          <a:p>
+            <a:pPr marL="800100" lvl="1" indent="-342900">
+              <a:buFont typeface="Arial" panose="020B0604020202020204" pitchFamily="34" charset="0"/>
+              <a:buChar char="•"/>
+            </a:pPr>
+            <a:r>
+              <a:rPr lang="en-US" dirty="0">
+                <a:latin typeface="Calibri" panose="020F0502020204030204" pitchFamily="34" charset="0"/>
+                <a:cs typeface="Calibri" panose="020F0502020204030204" pitchFamily="34" charset="0"/>
+              </a:rPr>
+              <a:t>Nested folder structure</a:t>
+            </a:r>
+          </a:p>
+          <a:p>
+            <a:pPr marL="800100" lvl="1" indent="-342900">
+              <a:buFont typeface="Arial" panose="020B0604020202020204" pitchFamily="34" charset="0"/>
+              <a:buChar char="•"/>
+            </a:pPr>
+            <a:r>
+              <a:rPr lang="en-US" dirty="0">
+                <a:latin typeface="Calibri" panose="020F0502020204030204" pitchFamily="34" charset="0"/>
+                <a:cs typeface="Calibri" panose="020F0502020204030204" pitchFamily="34" charset="0"/>
+              </a:rPr>
+              <a:t>Metadata text files</a:t>
+            </a:r>
+          </a:p>
+          <a:p>
+            <a:pPr marL="800100" lvl="1" indent="-342900">
+              <a:buFont typeface="Arial" panose="020B0604020202020204" pitchFamily="34" charset="0"/>
+              <a:buChar char="•"/>
+            </a:pPr>
+            <a:r>
+              <a:rPr lang="en-US" dirty="0">
+                <a:latin typeface="Calibri" panose="020F0502020204030204" pitchFamily="34" charset="0"/>
+                <a:cs typeface="Calibri" panose="020F0502020204030204" pitchFamily="34" charset="0"/>
+              </a:rPr>
+              <a:t>Binary data array chunks files</a:t>
+            </a:r>
+          </a:p>
+          <a:p>
+            <a:pPr marL="342900" indent="-342900">
+              <a:buFont typeface="Arial" panose="020B0604020202020204" pitchFamily="34" charset="0"/>
+              <a:buChar char="•"/>
+            </a:pPr>
+            <a:r>
+              <a:rPr lang="en-US" dirty="0">
+                <a:latin typeface="Calibri" panose="020F0502020204030204" pitchFamily="34" charset="0"/>
+                <a:cs typeface="Calibri" panose="020F0502020204030204" pitchFamily="34" charset="0"/>
+              </a:rPr>
+              <a:t>One OME-Zarr folder can contain multiple 5D images</a:t>
+            </a:r>
+            <a:endParaRPr lang="en-DE" dirty="0">
+              <a:latin typeface="Calibri" panose="020F0502020204030204" pitchFamily="34" charset="0"/>
+              <a:cs typeface="Calibri" panose="020F0502020204030204" pitchFamily="34" charset="0"/>
             </a:endParaRPr>
           </a:p>
         </p:txBody>

</xml_diff>